<commit_message>
add scope to pres and ignore temp .pptx file
</commit_message>
<xml_diff>
--- a/Pres.pptx
+++ b/Pres.pptx
@@ -13,10 +13,11 @@
     <p:sldId id="256" r:id="rId7"/>
     <p:sldId id="259" r:id="rId8"/>
     <p:sldId id="260" r:id="rId9"/>
-    <p:sldId id="265" r:id="rId10"/>
-    <p:sldId id="266" r:id="rId11"/>
-    <p:sldId id="267" r:id="rId12"/>
-    <p:sldId id="258" r:id="rId13"/>
+    <p:sldId id="268" r:id="rId10"/>
+    <p:sldId id="265" r:id="rId11"/>
+    <p:sldId id="266" r:id="rId12"/>
+    <p:sldId id="267" r:id="rId13"/>
+    <p:sldId id="258" r:id="rId14"/>
   </p:sldIdLst>
   <p:sldSz cx="12192000" cy="6858000"/>
   <p:notesSz cx="6858000" cy="9144000"/>
@@ -270,7 +271,7 @@
           <a:p>
             <a:fld id="{98C5D0A0-7D22-BE42-9A30-B4115F904EDD}" type="datetimeFigureOut">
               <a:rPr lang="de-DE" smtClean="0"/>
-              <a:t>24.11.2023</a:t>
+              <a:t>26.11.23</a:t>
             </a:fld>
             <a:endParaRPr lang="de-DE"/>
           </a:p>
@@ -468,7 +469,7 @@
           <a:p>
             <a:fld id="{98C5D0A0-7D22-BE42-9A30-B4115F904EDD}" type="datetimeFigureOut">
               <a:rPr lang="de-DE" smtClean="0"/>
-              <a:t>24.11.2023</a:t>
+              <a:t>26.11.23</a:t>
             </a:fld>
             <a:endParaRPr lang="de-DE"/>
           </a:p>
@@ -676,7 +677,7 @@
           <a:p>
             <a:fld id="{98C5D0A0-7D22-BE42-9A30-B4115F904EDD}" type="datetimeFigureOut">
               <a:rPr lang="de-DE" smtClean="0"/>
-              <a:t>24.11.2023</a:t>
+              <a:t>26.11.23</a:t>
             </a:fld>
             <a:endParaRPr lang="de-DE"/>
           </a:p>
@@ -874,7 +875,7 @@
           <a:p>
             <a:fld id="{98C5D0A0-7D22-BE42-9A30-B4115F904EDD}" type="datetimeFigureOut">
               <a:rPr lang="de-DE" smtClean="0"/>
-              <a:t>24.11.2023</a:t>
+              <a:t>26.11.23</a:t>
             </a:fld>
             <a:endParaRPr lang="de-DE"/>
           </a:p>
@@ -1149,7 +1150,7 @@
           <a:p>
             <a:fld id="{98C5D0A0-7D22-BE42-9A30-B4115F904EDD}" type="datetimeFigureOut">
               <a:rPr lang="de-DE" smtClean="0"/>
-              <a:t>24.11.2023</a:t>
+              <a:t>26.11.23</a:t>
             </a:fld>
             <a:endParaRPr lang="de-DE"/>
           </a:p>
@@ -1414,7 +1415,7 @@
           <a:p>
             <a:fld id="{98C5D0A0-7D22-BE42-9A30-B4115F904EDD}" type="datetimeFigureOut">
               <a:rPr lang="de-DE" smtClean="0"/>
-              <a:t>24.11.2023</a:t>
+              <a:t>26.11.23</a:t>
             </a:fld>
             <a:endParaRPr lang="de-DE"/>
           </a:p>
@@ -1826,7 +1827,7 @@
           <a:p>
             <a:fld id="{98C5D0A0-7D22-BE42-9A30-B4115F904EDD}" type="datetimeFigureOut">
               <a:rPr lang="de-DE" smtClean="0"/>
-              <a:t>24.11.2023</a:t>
+              <a:t>26.11.23</a:t>
             </a:fld>
             <a:endParaRPr lang="de-DE"/>
           </a:p>
@@ -1967,7 +1968,7 @@
           <a:p>
             <a:fld id="{98C5D0A0-7D22-BE42-9A30-B4115F904EDD}" type="datetimeFigureOut">
               <a:rPr lang="de-DE" smtClean="0"/>
-              <a:t>24.11.2023</a:t>
+              <a:t>26.11.23</a:t>
             </a:fld>
             <a:endParaRPr lang="de-DE"/>
           </a:p>
@@ -2080,7 +2081,7 @@
           <a:p>
             <a:fld id="{98C5D0A0-7D22-BE42-9A30-B4115F904EDD}" type="datetimeFigureOut">
               <a:rPr lang="de-DE" smtClean="0"/>
-              <a:t>24.11.2023</a:t>
+              <a:t>26.11.23</a:t>
             </a:fld>
             <a:endParaRPr lang="de-DE"/>
           </a:p>
@@ -2391,7 +2392,7 @@
           <a:p>
             <a:fld id="{98C5D0A0-7D22-BE42-9A30-B4115F904EDD}" type="datetimeFigureOut">
               <a:rPr lang="de-DE" smtClean="0"/>
-              <a:t>24.11.2023</a:t>
+              <a:t>26.11.23</a:t>
             </a:fld>
             <a:endParaRPr lang="de-DE"/>
           </a:p>
@@ -2679,7 +2680,7 @@
           <a:p>
             <a:fld id="{98C5D0A0-7D22-BE42-9A30-B4115F904EDD}" type="datetimeFigureOut">
               <a:rPr lang="de-DE" smtClean="0"/>
-              <a:t>24.11.2023</a:t>
+              <a:t>26.11.23</a:t>
             </a:fld>
             <a:endParaRPr lang="de-DE"/>
           </a:p>
@@ -2920,7 +2921,7 @@
           <a:p>
             <a:fld id="{98C5D0A0-7D22-BE42-9A30-B4115F904EDD}" type="datetimeFigureOut">
               <a:rPr lang="de-DE" smtClean="0"/>
-              <a:t>24.11.2023</a:t>
+              <a:t>26.11.23</a:t>
             </a:fld>
             <a:endParaRPr lang="de-DE"/>
           </a:p>
@@ -5658,6 +5659,236 @@
           <p:cNvPr id="2" name="Titel 1">
             <a:extLst>
               <a:ext uri="{FF2B5EF4-FFF2-40B4-BE49-F238E27FC236}">
+                <a16:creationId xmlns:a16="http://schemas.microsoft.com/office/drawing/2014/main" id="{AB0AF7AC-96AA-F168-C11F-5BBBFBE1A7BE}"/>
+              </a:ext>
+            </a:extLst>
+          </p:cNvPr>
+          <p:cNvSpPr>
+            <a:spLocks noGrp="1"/>
+          </p:cNvSpPr>
+          <p:nvPr>
+            <p:ph type="title"/>
+          </p:nvPr>
+        </p:nvSpPr>
+        <p:spPr/>
+        <p:txBody>
+          <a:bodyPr/>
+          <a:lstStyle/>
+          <a:p>
+            <a:r>
+              <a:rPr lang="de-DE" dirty="0" err="1"/>
+              <a:t>Types</a:t>
+            </a:r>
+            <a:r>
+              <a:rPr lang="de-DE" dirty="0"/>
+              <a:t> </a:t>
+            </a:r>
+            <a:r>
+              <a:rPr lang="de-DE" dirty="0" err="1"/>
+              <a:t>that</a:t>
+            </a:r>
+            <a:r>
+              <a:rPr lang="de-DE" dirty="0"/>
+              <a:t> </a:t>
+            </a:r>
+            <a:r>
+              <a:rPr lang="de-DE" dirty="0" err="1"/>
+              <a:t>implement</a:t>
+            </a:r>
+            <a:r>
+              <a:rPr lang="de-DE" dirty="0"/>
+              <a:t> </a:t>
+            </a:r>
+            <a:r>
+              <a:rPr lang="de-DE" dirty="0" err="1"/>
+              <a:t>FromRequest</a:t>
+            </a:r>
+            <a:endParaRPr lang="de-AT" dirty="0"/>
+          </a:p>
+        </p:txBody>
+      </p:sp>
+      <p:pic>
+        <p:nvPicPr>
+          <p:cNvPr id="5" name="Inhaltsplatzhalter 4">
+            <a:extLst>
+              <a:ext uri="{FF2B5EF4-FFF2-40B4-BE49-F238E27FC236}">
+                <a16:creationId xmlns:a16="http://schemas.microsoft.com/office/drawing/2014/main" id="{DCFF9773-37F1-9607-2C23-B72638ECCE8B}"/>
+              </a:ext>
+            </a:extLst>
+          </p:cNvPr>
+          <p:cNvPicPr>
+            <a:picLocks noGrp="1" noChangeAspect="1"/>
+          </p:cNvPicPr>
+          <p:nvPr>
+            <p:ph idx="1"/>
+          </p:nvPr>
+        </p:nvPicPr>
+        <p:blipFill>
+          <a:blip r:embed="rId2"/>
+          <a:stretch>
+            <a:fillRect/>
+          </a:stretch>
+        </p:blipFill>
+        <p:spPr>
+          <a:xfrm>
+            <a:off x="960498" y="1841061"/>
+            <a:ext cx="1038225" cy="4267200"/>
+          </a:xfrm>
+        </p:spPr>
+      </p:pic>
+      <p:sp>
+        <p:nvSpPr>
+          <p:cNvPr id="6" name="Pfeil: nach rechts 5">
+            <a:extLst>
+              <a:ext uri="{FF2B5EF4-FFF2-40B4-BE49-F238E27FC236}">
+                <a16:creationId xmlns:a16="http://schemas.microsoft.com/office/drawing/2014/main" id="{FAA45500-624A-3F12-25F0-64D3E235F726}"/>
+              </a:ext>
+            </a:extLst>
+          </p:cNvPr>
+          <p:cNvSpPr/>
+          <p:nvPr/>
+        </p:nvSpPr>
+        <p:spPr>
+          <a:xfrm>
+            <a:off x="2361460" y="3737499"/>
+            <a:ext cx="5051394" cy="204186"/>
+          </a:xfrm>
+          <a:prstGeom prst="rightArrow">
+            <a:avLst/>
+          </a:prstGeom>
+        </p:spPr>
+        <p:style>
+          <a:lnRef idx="2">
+            <a:schemeClr val="accent1">
+              <a:shade val="50000"/>
+            </a:schemeClr>
+          </a:lnRef>
+          <a:fillRef idx="1">
+            <a:schemeClr val="accent1"/>
+          </a:fillRef>
+          <a:effectRef idx="0">
+            <a:schemeClr val="accent1"/>
+          </a:effectRef>
+          <a:fontRef idx="minor">
+            <a:schemeClr val="lt1"/>
+          </a:fontRef>
+        </p:style>
+        <p:txBody>
+          <a:bodyPr rtlCol="0" anchor="ctr"/>
+          <a:lstStyle/>
+          <a:p>
+            <a:pPr algn="ctr"/>
+            <a:endParaRPr lang="de-AT"/>
+          </a:p>
+        </p:txBody>
+      </p:sp>
+      <p:sp>
+        <p:nvSpPr>
+          <p:cNvPr id="7" name="Textfeld 6">
+            <a:extLst>
+              <a:ext uri="{FF2B5EF4-FFF2-40B4-BE49-F238E27FC236}">
+                <a16:creationId xmlns:a16="http://schemas.microsoft.com/office/drawing/2014/main" id="{D086DF05-7058-FE70-8E04-868371188E77}"/>
+              </a:ext>
+            </a:extLst>
+          </p:cNvPr>
+          <p:cNvSpPr txBox="1"/>
+          <p:nvPr/>
+        </p:nvSpPr>
+        <p:spPr>
+          <a:xfrm>
+            <a:off x="7775591" y="3506680"/>
+            <a:ext cx="3463541" cy="646331"/>
+          </a:xfrm>
+          <a:prstGeom prst="rect">
+            <a:avLst/>
+          </a:prstGeom>
+          <a:noFill/>
+        </p:spPr>
+        <p:txBody>
+          <a:bodyPr wrap="square" rtlCol="0">
+            <a:spAutoFit/>
+          </a:bodyPr>
+          <a:lstStyle/>
+          <a:p>
+            <a:r>
+              <a:rPr lang="de-DE" dirty="0"/>
+              <a:t>Extract </a:t>
+            </a:r>
+            <a:r>
+              <a:rPr lang="de-DE" dirty="0" err="1"/>
+              <a:t>data</a:t>
+            </a:r>
+            <a:r>
+              <a:rPr lang="de-DE" dirty="0"/>
+              <a:t> </a:t>
+            </a:r>
+            <a:r>
+              <a:rPr lang="de-DE" dirty="0" err="1"/>
+              <a:t>from</a:t>
+            </a:r>
+            <a:r>
+              <a:rPr lang="de-DE" dirty="0"/>
+              <a:t> </a:t>
+            </a:r>
+            <a:r>
+              <a:rPr lang="de-DE" dirty="0" err="1"/>
+              <a:t>the</a:t>
+            </a:r>
+            <a:r>
+              <a:rPr lang="de-DE" dirty="0"/>
+              <a:t> </a:t>
+            </a:r>
+            <a:r>
+              <a:rPr lang="de-DE" dirty="0" err="1"/>
+              <a:t>client‘s</a:t>
+            </a:r>
+            <a:r>
+              <a:rPr lang="de-DE" dirty="0"/>
+              <a:t> </a:t>
+            </a:r>
+            <a:r>
+              <a:rPr lang="de-DE" dirty="0" err="1"/>
+              <a:t>HttpRequest</a:t>
+            </a:r>
+            <a:endParaRPr lang="de-AT" dirty="0"/>
+          </a:p>
+        </p:txBody>
+      </p:sp>
+    </p:spTree>
+    <p:extLst>
+      <p:ext uri="{BB962C8B-B14F-4D97-AF65-F5344CB8AC3E}">
+        <p14:creationId xmlns:p14="http://schemas.microsoft.com/office/powerpoint/2010/main" val="3208059671"/>
+      </p:ext>
+    </p:extLst>
+  </p:cSld>
+  <p:clrMapOvr>
+    <a:masterClrMapping/>
+  </p:clrMapOvr>
+</p:sld>
+</file>
+
+<file path=ppt/slides/slide11.xml><?xml version="1.0" encoding="utf-8"?>
+<p:sld xmlns:a="http://schemas.openxmlformats.org/drawingml/2006/main" xmlns:r="http://schemas.openxmlformats.org/officeDocument/2006/relationships" xmlns:p="http://schemas.openxmlformats.org/presentationml/2006/main">
+  <p:cSld>
+    <p:spTree>
+      <p:nvGrpSpPr>
+        <p:cNvPr id="1" name=""/>
+        <p:cNvGrpSpPr/>
+        <p:nvPr/>
+      </p:nvGrpSpPr>
+      <p:grpSpPr>
+        <a:xfrm>
+          <a:off x="0" y="0"/>
+          <a:ext cx="0" cy="0"/>
+          <a:chOff x="0" y="0"/>
+          <a:chExt cx="0" cy="0"/>
+        </a:xfrm>
+      </p:grpSpPr>
+      <p:sp>
+        <p:nvSpPr>
+          <p:cNvPr id="2" name="Titel 1">
+            <a:extLst>
+              <a:ext uri="{FF2B5EF4-FFF2-40B4-BE49-F238E27FC236}">
                 <a16:creationId xmlns:a16="http://schemas.microsoft.com/office/drawing/2014/main" id="{A2133C53-ACA7-77D9-1892-A1D212AB4255}"/>
               </a:ext>
             </a:extLst>
@@ -5756,7 +5987,7 @@
 </p:sld>
 </file>
 
-<file path=ppt/slides/slide11.xml><?xml version="1.0" encoding="utf-8"?>
+<file path=ppt/slides/slide12.xml><?xml version="1.0" encoding="utf-8"?>
 <p:sld xmlns:a="http://schemas.openxmlformats.org/drawingml/2006/main" xmlns:r="http://schemas.openxmlformats.org/officeDocument/2006/relationships" xmlns:p="http://schemas.openxmlformats.org/presentationml/2006/main">
   <p:cSld>
     <p:spTree>
@@ -6037,7 +6268,7 @@
 </p:sld>
 </file>
 
-<file path=ppt/slides/slide12.xml><?xml version="1.0" encoding="utf-8"?>
+<file path=ppt/slides/slide13.xml><?xml version="1.0" encoding="utf-8"?>
 <p:sld xmlns:a="http://schemas.openxmlformats.org/drawingml/2006/main" xmlns:r="http://schemas.openxmlformats.org/officeDocument/2006/relationships" xmlns:p="http://schemas.openxmlformats.org/presentationml/2006/main">
   <p:cSld>
     <p:spTree>
@@ -8743,7 +8974,7 @@
           <p:cNvPr id="2" name="Titel 1">
             <a:extLst>
               <a:ext uri="{FF2B5EF4-FFF2-40B4-BE49-F238E27FC236}">
-                <a16:creationId xmlns:a16="http://schemas.microsoft.com/office/drawing/2014/main" id="{AB0AF7AC-96AA-F168-C11F-5BBBFBE1A7BE}"/>
+                <a16:creationId xmlns:a16="http://schemas.microsoft.com/office/drawing/2014/main" id="{DE28BBC6-A8B3-01DD-B469-C9EC43354124}"/>
               </a:ext>
             </a:extLst>
           </p:cNvPr>
@@ -8761,146 +8992,77 @@
           <a:p>
             <a:r>
               <a:rPr lang="de-DE" dirty="0" err="1"/>
-              <a:t>Types</a:t>
+              <a:t>Defining</a:t>
             </a:r>
             <a:r>
               <a:rPr lang="de-DE" dirty="0"/>
-              <a:t> </a:t>
+              <a:t> a </a:t>
             </a:r>
             <a:r>
               <a:rPr lang="de-DE" dirty="0" err="1"/>
-              <a:t>that</a:t>
-            </a:r>
-            <a:r>
-              <a:rPr lang="de-DE" dirty="0"/>
-              <a:t> </a:t>
-            </a:r>
-            <a:r>
-              <a:rPr lang="de-DE" dirty="0" err="1"/>
-              <a:t>implement</a:t>
-            </a:r>
-            <a:r>
-              <a:rPr lang="de-DE" dirty="0"/>
-              <a:t> </a:t>
-            </a:r>
-            <a:r>
-              <a:rPr lang="de-DE" dirty="0" err="1"/>
-              <a:t>FromRequest</a:t>
-            </a:r>
-            <a:endParaRPr lang="de-AT" dirty="0"/>
-          </a:p>
-        </p:txBody>
-      </p:sp>
-      <p:pic>
-        <p:nvPicPr>
-          <p:cNvPr id="5" name="Inhaltsplatzhalter 4">
-            <a:extLst>
-              <a:ext uri="{FF2B5EF4-FFF2-40B4-BE49-F238E27FC236}">
-                <a16:creationId xmlns:a16="http://schemas.microsoft.com/office/drawing/2014/main" id="{DCFF9773-37F1-9607-2C23-B72638ECCE8B}"/>
-              </a:ext>
-            </a:extLst>
-          </p:cNvPr>
-          <p:cNvPicPr>
-            <a:picLocks noGrp="1" noChangeAspect="1"/>
-          </p:cNvPicPr>
-          <p:nvPr>
-            <p:ph idx="1"/>
-          </p:nvPr>
-        </p:nvPicPr>
-        <p:blipFill>
-          <a:blip r:embed="rId2"/>
-          <a:stretch>
-            <a:fillRect/>
-          </a:stretch>
-        </p:blipFill>
-        <p:spPr>
-          <a:xfrm>
-            <a:off x="960498" y="1841061"/>
-            <a:ext cx="1038225" cy="4267200"/>
-          </a:xfrm>
-        </p:spPr>
-      </p:pic>
-      <p:sp>
-        <p:nvSpPr>
-          <p:cNvPr id="6" name="Pfeil: nach rechts 5">
-            <a:extLst>
-              <a:ext uri="{FF2B5EF4-FFF2-40B4-BE49-F238E27FC236}">
-                <a16:creationId xmlns:a16="http://schemas.microsoft.com/office/drawing/2014/main" id="{FAA45500-624A-3F12-25F0-64D3E235F726}"/>
-              </a:ext>
-            </a:extLst>
-          </p:cNvPr>
-          <p:cNvSpPr/>
-          <p:nvPr/>
-        </p:nvSpPr>
-        <p:spPr>
-          <a:xfrm>
-            <a:off x="2361460" y="3737499"/>
-            <a:ext cx="5051394" cy="204186"/>
-          </a:xfrm>
-          <a:prstGeom prst="rightArrow">
-            <a:avLst/>
-          </a:prstGeom>
-        </p:spPr>
-        <p:style>
-          <a:lnRef idx="2">
-            <a:schemeClr val="accent1">
-              <a:shade val="50000"/>
-            </a:schemeClr>
-          </a:lnRef>
-          <a:fillRef idx="1">
-            <a:schemeClr val="accent1"/>
-          </a:fillRef>
-          <a:effectRef idx="0">
-            <a:schemeClr val="accent1"/>
-          </a:effectRef>
-          <a:fontRef idx="minor">
-            <a:schemeClr val="lt1"/>
-          </a:fontRef>
-        </p:style>
-        <p:txBody>
-          <a:bodyPr rtlCol="0" anchor="ctr"/>
-          <a:lstStyle/>
-          <a:p>
-            <a:pPr algn="ctr"/>
-            <a:endParaRPr lang="de-AT"/>
+              <a:t>scope</a:t>
+            </a:r>
+            <a:endParaRPr lang="de-DE" dirty="0"/>
           </a:p>
         </p:txBody>
       </p:sp>
       <p:sp>
         <p:nvSpPr>
-          <p:cNvPr id="7" name="Textfeld 6">
-            <a:extLst>
-              <a:ext uri="{FF2B5EF4-FFF2-40B4-BE49-F238E27FC236}">
-                <a16:creationId xmlns:a16="http://schemas.microsoft.com/office/drawing/2014/main" id="{D086DF05-7058-FE70-8E04-868371188E77}"/>
-              </a:ext>
-            </a:extLst>
-          </p:cNvPr>
-          <p:cNvSpPr txBox="1"/>
-          <p:nvPr/>
+          <p:cNvPr id="3" name="Inhaltsplatzhalter 2">
+            <a:extLst>
+              <a:ext uri="{FF2B5EF4-FFF2-40B4-BE49-F238E27FC236}">
+                <a16:creationId xmlns:a16="http://schemas.microsoft.com/office/drawing/2014/main" id="{B29092B3-A0B6-ADAC-CB1A-9D8A07B0A8E5}"/>
+              </a:ext>
+            </a:extLst>
+          </p:cNvPr>
+          <p:cNvSpPr>
+            <a:spLocks noGrp="1"/>
+          </p:cNvSpPr>
+          <p:nvPr>
+            <p:ph idx="1"/>
+          </p:nvPr>
         </p:nvSpPr>
-        <p:spPr>
-          <a:xfrm>
-            <a:off x="7775591" y="3506680"/>
-            <a:ext cx="3463541" cy="646331"/>
-          </a:xfrm>
-          <a:prstGeom prst="rect">
-            <a:avLst/>
-          </a:prstGeom>
-          <a:noFill/>
-        </p:spPr>
+        <p:spPr/>
         <p:txBody>
-          <a:bodyPr wrap="square" rtlCol="0">
-            <a:spAutoFit/>
+          <a:bodyPr>
+            <a:normAutofit fontScale="92500"/>
           </a:bodyPr>
           <a:lstStyle/>
           <a:p>
+            <a:pPr marL="0" indent="0">
+              <a:buNone/>
+            </a:pPr>
             <a:r>
               <a:rPr lang="de-DE" dirty="0"/>
-              <a:t>Extract </a:t>
+              <a:t>Registered </a:t>
             </a:r>
             <a:r>
               <a:rPr lang="de-DE" dirty="0" err="1"/>
-              <a:t>data</a:t>
+              <a:t>routes</a:t>
+            </a:r>
+            <a:r>
+              <a:rPr lang="de-DE" dirty="0"/>
+              <a:t> in a </a:t>
+            </a:r>
+            <a:r>
+              <a:rPr lang="de-DE" dirty="0" err="1"/>
+              <a:t>scope</a:t>
+            </a:r>
+            <a:r>
+              <a:rPr lang="de-DE" dirty="0"/>
+              <a:t> will </a:t>
+            </a:r>
+            <a:r>
+              <a:rPr lang="de-DE" dirty="0" err="1"/>
+              <a:t>share</a:t>
+            </a:r>
+            <a:r>
+              <a:rPr lang="de-DE" dirty="0"/>
+              <a:t> a </a:t>
+            </a:r>
+            <a:r>
+              <a:rPr lang="de-DE" dirty="0" err="1"/>
+              <a:t>common</a:t>
             </a:r>
             <a:r>
               <a:rPr lang="de-DE" dirty="0"/>
@@ -8908,7 +9070,7 @@
             </a:r>
             <a:r>
               <a:rPr lang="de-DE" dirty="0" err="1"/>
-              <a:t>from</a:t>
+              <a:t>path</a:t>
             </a:r>
             <a:r>
               <a:rPr lang="de-DE" dirty="0"/>
@@ -8916,32 +9078,476 @@
             </a:r>
             <a:r>
               <a:rPr lang="de-DE" dirty="0" err="1"/>
-              <a:t>the</a:t>
-            </a:r>
+              <a:t>prefix</a:t>
+            </a:r>
+            <a:endParaRPr lang="de-DE" dirty="0"/>
+          </a:p>
+          <a:p>
+            <a:pPr marL="0" indent="0">
+              <a:buNone/>
+            </a:pPr>
+            <a:endParaRPr lang="de-DE" dirty="0"/>
+          </a:p>
+          <a:p>
+            <a:pPr marL="0" indent="0">
+              <a:buNone/>
+            </a:pPr>
             <a:r>
               <a:rPr lang="de-DE" dirty="0"/>
+              <a:t>e.g.</a:t>
+            </a:r>
+          </a:p>
+          <a:p>
+            <a:pPr marL="0" indent="0">
+              <a:buNone/>
+            </a:pPr>
+            <a:endParaRPr lang="de-DE" dirty="0"/>
+          </a:p>
+          <a:p>
+            <a:pPr marL="0" indent="0">
+              <a:buNone/>
+            </a:pPr>
+            <a:r>
+              <a:rPr lang="de-AT" b="0" dirty="0" err="1">
+                <a:solidFill>
+                  <a:srgbClr val="DCDCAA"/>
+                </a:solidFill>
+                <a:effectLst/>
+                <a:latin typeface="Menlo" panose="020B0609030804020204" pitchFamily="49" charset="0"/>
+              </a:rPr>
+              <a:t>service</a:t>
+            </a:r>
+            <a:r>
+              <a:rPr lang="de-AT" b="0" dirty="0">
+                <a:solidFill>
+                  <a:srgbClr val="CCCCCC"/>
+                </a:solidFill>
+                <a:effectLst/>
+                <a:latin typeface="Menlo" panose="020B0609030804020204" pitchFamily="49" charset="0"/>
+              </a:rPr>
+              <a:t>(</a:t>
+            </a:r>
+          </a:p>
+          <a:p>
+            <a:pPr marL="0" indent="0">
+              <a:buNone/>
+            </a:pPr>
+            <a:r>
+              <a:rPr lang="de-AT" b="0" dirty="0">
+                <a:solidFill>
+                  <a:srgbClr val="4EC9B0"/>
+                </a:solidFill>
+                <a:effectLst/>
+                <a:latin typeface="Menlo" panose="020B0609030804020204" pitchFamily="49" charset="0"/>
+              </a:rPr>
+              <a:t>	web</a:t>
+            </a:r>
+            <a:r>
+              <a:rPr lang="de-AT" b="0" dirty="0">
+                <a:solidFill>
+                  <a:srgbClr val="D4D4D4"/>
+                </a:solidFill>
+                <a:effectLst/>
+                <a:latin typeface="Menlo" panose="020B0609030804020204" pitchFamily="49" charset="0"/>
+              </a:rPr>
+              <a:t>::</a:t>
+            </a:r>
+            <a:r>
+              <a:rPr lang="de-AT" b="0" dirty="0" err="1">
+                <a:solidFill>
+                  <a:srgbClr val="DCDCAA"/>
+                </a:solidFill>
+                <a:effectLst/>
+                <a:latin typeface="Menlo" panose="020B0609030804020204" pitchFamily="49" charset="0"/>
+              </a:rPr>
+              <a:t>scope</a:t>
+            </a:r>
+            <a:r>
+              <a:rPr lang="de-AT" b="0" dirty="0">
+                <a:solidFill>
+                  <a:srgbClr val="CCCCCC"/>
+                </a:solidFill>
+                <a:effectLst/>
+                <a:latin typeface="Menlo" panose="020B0609030804020204" pitchFamily="49" charset="0"/>
+              </a:rPr>
+              <a:t>(</a:t>
+            </a:r>
+            <a:r>
+              <a:rPr lang="de-AT" b="0" dirty="0">
+                <a:solidFill>
+                  <a:srgbClr val="CE9178"/>
+                </a:solidFill>
+                <a:effectLst/>
+                <a:latin typeface="Menlo" panose="020B0609030804020204" pitchFamily="49" charset="0"/>
+              </a:rPr>
+              <a:t>"/</a:t>
+            </a:r>
+            <a:r>
+              <a:rPr lang="de-AT" b="0" dirty="0" err="1">
+                <a:solidFill>
+                  <a:srgbClr val="CE9178"/>
+                </a:solidFill>
+                <a:effectLst/>
+                <a:latin typeface="Menlo" panose="020B0609030804020204" pitchFamily="49" charset="0"/>
+              </a:rPr>
+              <a:t>scope</a:t>
+            </a:r>
+            <a:r>
+              <a:rPr lang="de-AT" b="0" dirty="0">
+                <a:solidFill>
+                  <a:srgbClr val="CE9178"/>
+                </a:solidFill>
+                <a:effectLst/>
+                <a:latin typeface="Menlo" panose="020B0609030804020204" pitchFamily="49" charset="0"/>
+              </a:rPr>
+              <a:t>"</a:t>
+            </a:r>
+            <a:r>
+              <a:rPr lang="de-AT" b="0" dirty="0">
+                <a:solidFill>
+                  <a:srgbClr val="CCCCCC"/>
+                </a:solidFill>
+                <a:effectLst/>
+                <a:latin typeface="Menlo" panose="020B0609030804020204" pitchFamily="49" charset="0"/>
+              </a:rPr>
+              <a:t>) </a:t>
+            </a:r>
+          </a:p>
+          <a:p>
+            <a:pPr marL="0" indent="0">
+              <a:buNone/>
+            </a:pPr>
+            <a:r>
+              <a:rPr lang="de-AT" dirty="0">
+                <a:solidFill>
+                  <a:srgbClr val="D4D4D4"/>
+                </a:solidFill>
+                <a:latin typeface="Menlo" panose="020B0609030804020204" pitchFamily="49" charset="0"/>
+              </a:rPr>
+              <a:t>		</a:t>
+            </a:r>
+            <a:r>
+              <a:rPr lang="de-AT" b="0" dirty="0">
+                <a:solidFill>
+                  <a:srgbClr val="DCDCAA"/>
+                </a:solidFill>
+                <a:effectLst/>
+                <a:latin typeface="Menlo" panose="020B0609030804020204" pitchFamily="49" charset="0"/>
+              </a:rPr>
+              <a:t>route</a:t>
+            </a:r>
+            <a:r>
+              <a:rPr lang="de-AT" b="0" dirty="0">
+                <a:solidFill>
+                  <a:srgbClr val="CCCCCC"/>
+                </a:solidFill>
+                <a:effectLst/>
+                <a:latin typeface="Menlo" panose="020B0609030804020204" pitchFamily="49" charset="0"/>
+              </a:rPr>
+              <a:t>(</a:t>
+            </a:r>
+            <a:r>
+              <a:rPr lang="de-AT" b="0" dirty="0">
+                <a:solidFill>
+                  <a:srgbClr val="CE9178"/>
+                </a:solidFill>
+                <a:effectLst/>
+                <a:latin typeface="Menlo" panose="020B0609030804020204" pitchFamily="49" charset="0"/>
+              </a:rPr>
+              <a:t>"/sub1"</a:t>
+            </a:r>
+            <a:r>
+              <a:rPr lang="de-AT" b="0" dirty="0">
+                <a:solidFill>
+                  <a:srgbClr val="CCCCCC"/>
+                </a:solidFill>
+                <a:effectLst/>
+                <a:latin typeface="Menlo" panose="020B0609030804020204" pitchFamily="49" charset="0"/>
+              </a:rPr>
+              <a:t>, </a:t>
+            </a:r>
+            <a:r>
+              <a:rPr lang="de-AT" b="0" dirty="0">
+                <a:solidFill>
+                  <a:srgbClr val="4EC9B0"/>
+                </a:solidFill>
+                <a:effectLst/>
+                <a:latin typeface="Menlo" panose="020B0609030804020204" pitchFamily="49" charset="0"/>
+              </a:rPr>
+              <a:t>web</a:t>
+            </a:r>
+            <a:r>
+              <a:rPr lang="de-AT" b="0" dirty="0">
+                <a:solidFill>
+                  <a:srgbClr val="D4D4D4"/>
+                </a:solidFill>
+                <a:effectLst/>
+                <a:latin typeface="Menlo" panose="020B0609030804020204" pitchFamily="49" charset="0"/>
+              </a:rPr>
+              <a:t>::</a:t>
+            </a:r>
+            <a:r>
+              <a:rPr lang="de-AT" b="0" dirty="0" err="1">
+                <a:solidFill>
+                  <a:srgbClr val="DCDCAA"/>
+                </a:solidFill>
+                <a:effectLst/>
+                <a:latin typeface="Menlo" panose="020B0609030804020204" pitchFamily="49" charset="0"/>
+              </a:rPr>
+              <a:t>to</a:t>
+            </a:r>
+            <a:r>
+              <a:rPr lang="de-AT" b="0" dirty="0">
+                <a:solidFill>
+                  <a:srgbClr val="CCCCCC"/>
+                </a:solidFill>
+                <a:effectLst/>
+                <a:latin typeface="Menlo" panose="020B0609030804020204" pitchFamily="49" charset="0"/>
+              </a:rPr>
+              <a:t>(</a:t>
+            </a:r>
+            <a:r>
+              <a:rPr lang="de-AT" b="0" dirty="0">
+                <a:solidFill>
+                  <a:srgbClr val="D4D4D4"/>
+                </a:solidFill>
+                <a:effectLst/>
+                <a:latin typeface="Menlo" panose="020B0609030804020204" pitchFamily="49" charset="0"/>
+              </a:rPr>
+              <a:t>||</a:t>
+            </a:r>
+            <a:r>
+              <a:rPr lang="de-AT" b="0" dirty="0">
+                <a:solidFill>
+                  <a:srgbClr val="CCCCCC"/>
+                </a:solidFill>
+                <a:effectLst/>
+                <a:latin typeface="Menlo" panose="020B0609030804020204" pitchFamily="49" charset="0"/>
+              </a:rPr>
               <a:t> </a:t>
             </a:r>
             <a:r>
-              <a:rPr lang="de-DE" dirty="0" err="1"/>
-              <a:t>client‘s</a:t>
-            </a:r>
-            <a:r>
-              <a:rPr lang="de-DE" dirty="0"/>
+              <a:rPr lang="de-AT" b="0" dirty="0" err="1">
+                <a:solidFill>
+                  <a:srgbClr val="569CD6"/>
+                </a:solidFill>
+                <a:effectLst/>
+                <a:latin typeface="Menlo" panose="020B0609030804020204" pitchFamily="49" charset="0"/>
+              </a:rPr>
+              <a:t>async</a:t>
+            </a:r>
+            <a:r>
+              <a:rPr lang="de-AT" b="0" dirty="0">
+                <a:solidFill>
+                  <a:srgbClr val="CCCCCC"/>
+                </a:solidFill>
+                <a:effectLst/>
+                <a:latin typeface="Menlo" panose="020B0609030804020204" pitchFamily="49" charset="0"/>
+              </a:rPr>
+              <a:t> {</a:t>
+            </a:r>
+            <a:r>
+              <a:rPr lang="de-AT" b="0" dirty="0">
+                <a:solidFill>
+                  <a:srgbClr val="CE9178"/>
+                </a:solidFill>
+                <a:effectLst/>
+                <a:latin typeface="Menlo" panose="020B0609030804020204" pitchFamily="49" charset="0"/>
+              </a:rPr>
+              <a:t>"sub1"</a:t>
+            </a:r>
+            <a:r>
+              <a:rPr lang="de-AT" b="0" dirty="0">
+                <a:solidFill>
+                  <a:srgbClr val="CCCCCC"/>
+                </a:solidFill>
+                <a:effectLst/>
+                <a:latin typeface="Menlo" panose="020B0609030804020204" pitchFamily="49" charset="0"/>
+              </a:rPr>
+              <a:t>}))</a:t>
+            </a:r>
+          </a:p>
+          <a:p>
+            <a:pPr marL="0" indent="0">
+              <a:buNone/>
+            </a:pPr>
+            <a:r>
+              <a:rPr lang="de-AT" dirty="0">
+                <a:solidFill>
+                  <a:srgbClr val="D4D4D4"/>
+                </a:solidFill>
+                <a:latin typeface="Menlo" panose="020B0609030804020204" pitchFamily="49" charset="0"/>
+              </a:rPr>
+              <a:t>		</a:t>
+            </a:r>
+            <a:r>
+              <a:rPr lang="de-AT" b="0" dirty="0">
+                <a:solidFill>
+                  <a:srgbClr val="DCDCAA"/>
+                </a:solidFill>
+                <a:effectLst/>
+                <a:latin typeface="Menlo" panose="020B0609030804020204" pitchFamily="49" charset="0"/>
+              </a:rPr>
+              <a:t>route</a:t>
+            </a:r>
+            <a:r>
+              <a:rPr lang="de-AT" b="0" dirty="0">
+                <a:solidFill>
+                  <a:srgbClr val="CCCCCC"/>
+                </a:solidFill>
+                <a:effectLst/>
+                <a:latin typeface="Menlo" panose="020B0609030804020204" pitchFamily="49" charset="0"/>
+              </a:rPr>
+              <a:t>(</a:t>
+            </a:r>
+            <a:r>
+              <a:rPr lang="de-AT" b="0" dirty="0">
+                <a:solidFill>
+                  <a:srgbClr val="CE9178"/>
+                </a:solidFill>
+                <a:effectLst/>
+                <a:latin typeface="Menlo" panose="020B0609030804020204" pitchFamily="49" charset="0"/>
+              </a:rPr>
+              <a:t>"/sub2"</a:t>
+            </a:r>
+            <a:r>
+              <a:rPr lang="de-AT" b="0" dirty="0">
+                <a:solidFill>
+                  <a:srgbClr val="CCCCCC"/>
+                </a:solidFill>
+                <a:effectLst/>
+                <a:latin typeface="Menlo" panose="020B0609030804020204" pitchFamily="49" charset="0"/>
+              </a:rPr>
+              <a:t>, </a:t>
+            </a:r>
+            <a:r>
+              <a:rPr lang="de-AT" b="0" dirty="0">
+                <a:solidFill>
+                  <a:srgbClr val="4EC9B0"/>
+                </a:solidFill>
+                <a:effectLst/>
+                <a:latin typeface="Menlo" panose="020B0609030804020204" pitchFamily="49" charset="0"/>
+              </a:rPr>
+              <a:t>web</a:t>
+            </a:r>
+            <a:r>
+              <a:rPr lang="de-AT" b="0" dirty="0">
+                <a:solidFill>
+                  <a:srgbClr val="D4D4D4"/>
+                </a:solidFill>
+                <a:effectLst/>
+                <a:latin typeface="Menlo" panose="020B0609030804020204" pitchFamily="49" charset="0"/>
+              </a:rPr>
+              <a:t>::</a:t>
+            </a:r>
+            <a:r>
+              <a:rPr lang="de-AT" b="0" dirty="0" err="1">
+                <a:solidFill>
+                  <a:srgbClr val="DCDCAA"/>
+                </a:solidFill>
+                <a:effectLst/>
+                <a:latin typeface="Menlo" panose="020B0609030804020204" pitchFamily="49" charset="0"/>
+              </a:rPr>
+              <a:t>to</a:t>
+            </a:r>
+            <a:r>
+              <a:rPr lang="de-AT" b="0" dirty="0">
+                <a:solidFill>
+                  <a:srgbClr val="CCCCCC"/>
+                </a:solidFill>
+                <a:effectLst/>
+                <a:latin typeface="Menlo" panose="020B0609030804020204" pitchFamily="49" charset="0"/>
+              </a:rPr>
+              <a:t>(</a:t>
+            </a:r>
+            <a:r>
+              <a:rPr lang="de-AT" b="0" dirty="0">
+                <a:solidFill>
+                  <a:srgbClr val="D4D4D4"/>
+                </a:solidFill>
+                <a:effectLst/>
+                <a:latin typeface="Menlo" panose="020B0609030804020204" pitchFamily="49" charset="0"/>
+              </a:rPr>
+              <a:t>||</a:t>
+            </a:r>
+            <a:r>
+              <a:rPr lang="de-AT" b="0" dirty="0">
+                <a:solidFill>
+                  <a:srgbClr val="CCCCCC"/>
+                </a:solidFill>
+                <a:effectLst/>
+                <a:latin typeface="Menlo" panose="020B0609030804020204" pitchFamily="49" charset="0"/>
+              </a:rPr>
               <a:t> </a:t>
             </a:r>
             <a:r>
-              <a:rPr lang="de-DE" dirty="0" err="1"/>
-              <a:t>HttpRequest</a:t>
-            </a:r>
-            <a:endParaRPr lang="de-AT" dirty="0"/>
+              <a:rPr lang="de-AT" b="0" dirty="0" err="1">
+                <a:solidFill>
+                  <a:srgbClr val="569CD6"/>
+                </a:solidFill>
+                <a:effectLst/>
+                <a:latin typeface="Menlo" panose="020B0609030804020204" pitchFamily="49" charset="0"/>
+              </a:rPr>
+              <a:t>async</a:t>
+            </a:r>
+            <a:r>
+              <a:rPr lang="de-AT" b="0" dirty="0">
+                <a:solidFill>
+                  <a:srgbClr val="CCCCCC"/>
+                </a:solidFill>
+                <a:effectLst/>
+                <a:latin typeface="Menlo" panose="020B0609030804020204" pitchFamily="49" charset="0"/>
+              </a:rPr>
+              <a:t> {</a:t>
+            </a:r>
+            <a:r>
+              <a:rPr lang="de-AT" b="0" dirty="0">
+                <a:solidFill>
+                  <a:srgbClr val="CE9178"/>
+                </a:solidFill>
+                <a:effectLst/>
+                <a:latin typeface="Menlo" panose="020B0609030804020204" pitchFamily="49" charset="0"/>
+              </a:rPr>
+              <a:t>"sub2"</a:t>
+            </a:r>
+            <a:r>
+              <a:rPr lang="de-AT" b="0" dirty="0">
+                <a:solidFill>
+                  <a:srgbClr val="CCCCCC"/>
+                </a:solidFill>
+                <a:effectLst/>
+                <a:latin typeface="Menlo" panose="020B0609030804020204" pitchFamily="49" charset="0"/>
+              </a:rPr>
+              <a:t>}))</a:t>
+            </a:r>
+          </a:p>
+          <a:p>
+            <a:pPr marL="0" indent="0">
+              <a:buNone/>
+            </a:pPr>
+            <a:r>
+              <a:rPr lang="de-AT" b="0" dirty="0">
+                <a:solidFill>
+                  <a:srgbClr val="CCCCCC"/>
+                </a:solidFill>
+                <a:effectLst/>
+                <a:latin typeface="Menlo" panose="020B0609030804020204" pitchFamily="49" charset="0"/>
+              </a:rPr>
+              <a:t>)</a:t>
+            </a:r>
+          </a:p>
+          <a:p>
+            <a:pPr marL="0" indent="0">
+              <a:buNone/>
+            </a:pPr>
+            <a:endParaRPr lang="de-DE" dirty="0"/>
           </a:p>
         </p:txBody>
       </p:sp>
     </p:spTree>
     <p:extLst>
       <p:ext uri="{BB962C8B-B14F-4D97-AF65-F5344CB8AC3E}">
-        <p14:creationId xmlns:p14="http://schemas.microsoft.com/office/powerpoint/2010/main" val="3208059671"/>
+        <p14:creationId xmlns:p14="http://schemas.microsoft.com/office/powerpoint/2010/main" val="3996451288"/>
       </p:ext>
     </p:extLst>
   </p:cSld>

</xml_diff>

<commit_message>
change pres and code
</commit_message>
<xml_diff>
--- a/Pres.pptx
+++ b/Pres.pptx
@@ -12,16 +12,17 @@
     <p:sldId id="256" r:id="rId6"/>
     <p:sldId id="259" r:id="rId7"/>
     <p:sldId id="260" r:id="rId8"/>
-    <p:sldId id="265" r:id="rId9"/>
-    <p:sldId id="266" r:id="rId10"/>
-    <p:sldId id="268" r:id="rId11"/>
-    <p:sldId id="267" r:id="rId12"/>
-    <p:sldId id="269" r:id="rId13"/>
-    <p:sldId id="270" r:id="rId14"/>
-    <p:sldId id="271" r:id="rId15"/>
-    <p:sldId id="272" r:id="rId16"/>
-    <p:sldId id="258" r:id="rId17"/>
-    <p:sldId id="273" r:id="rId18"/>
+    <p:sldId id="274" r:id="rId9"/>
+    <p:sldId id="265" r:id="rId10"/>
+    <p:sldId id="266" r:id="rId11"/>
+    <p:sldId id="268" r:id="rId12"/>
+    <p:sldId id="267" r:id="rId13"/>
+    <p:sldId id="269" r:id="rId14"/>
+    <p:sldId id="270" r:id="rId15"/>
+    <p:sldId id="271" r:id="rId16"/>
+    <p:sldId id="272" r:id="rId17"/>
+    <p:sldId id="258" r:id="rId18"/>
+    <p:sldId id="273" r:id="rId19"/>
   </p:sldIdLst>
   <p:sldSz cx="12192000" cy="6858000"/>
   <p:notesSz cx="6858000" cy="9144000"/>
@@ -275,7 +276,7 @@
           <a:p>
             <a:fld id="{98C5D0A0-7D22-BE42-9A30-B4115F904EDD}" type="datetimeFigureOut">
               <a:rPr lang="de-DE" smtClean="0"/>
-              <a:t>26.11.23</a:t>
+              <a:t>27.11.23</a:t>
             </a:fld>
             <a:endParaRPr lang="de-DE"/>
           </a:p>
@@ -473,7 +474,7 @@
           <a:p>
             <a:fld id="{98C5D0A0-7D22-BE42-9A30-B4115F904EDD}" type="datetimeFigureOut">
               <a:rPr lang="de-DE" smtClean="0"/>
-              <a:t>26.11.23</a:t>
+              <a:t>27.11.23</a:t>
             </a:fld>
             <a:endParaRPr lang="de-DE"/>
           </a:p>
@@ -681,7 +682,7 @@
           <a:p>
             <a:fld id="{98C5D0A0-7D22-BE42-9A30-B4115F904EDD}" type="datetimeFigureOut">
               <a:rPr lang="de-DE" smtClean="0"/>
-              <a:t>26.11.23</a:t>
+              <a:t>27.11.23</a:t>
             </a:fld>
             <a:endParaRPr lang="de-DE"/>
           </a:p>
@@ -879,7 +880,7 @@
           <a:p>
             <a:fld id="{98C5D0A0-7D22-BE42-9A30-B4115F904EDD}" type="datetimeFigureOut">
               <a:rPr lang="de-DE" smtClean="0"/>
-              <a:t>26.11.23</a:t>
+              <a:t>27.11.23</a:t>
             </a:fld>
             <a:endParaRPr lang="de-DE"/>
           </a:p>
@@ -1154,7 +1155,7 @@
           <a:p>
             <a:fld id="{98C5D0A0-7D22-BE42-9A30-B4115F904EDD}" type="datetimeFigureOut">
               <a:rPr lang="de-DE" smtClean="0"/>
-              <a:t>26.11.23</a:t>
+              <a:t>27.11.23</a:t>
             </a:fld>
             <a:endParaRPr lang="de-DE"/>
           </a:p>
@@ -1419,7 +1420,7 @@
           <a:p>
             <a:fld id="{98C5D0A0-7D22-BE42-9A30-B4115F904EDD}" type="datetimeFigureOut">
               <a:rPr lang="de-DE" smtClean="0"/>
-              <a:t>26.11.23</a:t>
+              <a:t>27.11.23</a:t>
             </a:fld>
             <a:endParaRPr lang="de-DE"/>
           </a:p>
@@ -1831,7 +1832,7 @@
           <a:p>
             <a:fld id="{98C5D0A0-7D22-BE42-9A30-B4115F904EDD}" type="datetimeFigureOut">
               <a:rPr lang="de-DE" smtClean="0"/>
-              <a:t>26.11.23</a:t>
+              <a:t>27.11.23</a:t>
             </a:fld>
             <a:endParaRPr lang="de-DE"/>
           </a:p>
@@ -1972,7 +1973,7 @@
           <a:p>
             <a:fld id="{98C5D0A0-7D22-BE42-9A30-B4115F904EDD}" type="datetimeFigureOut">
               <a:rPr lang="de-DE" smtClean="0"/>
-              <a:t>26.11.23</a:t>
+              <a:t>27.11.23</a:t>
             </a:fld>
             <a:endParaRPr lang="de-DE"/>
           </a:p>
@@ -2085,7 +2086,7 @@
           <a:p>
             <a:fld id="{98C5D0A0-7D22-BE42-9A30-B4115F904EDD}" type="datetimeFigureOut">
               <a:rPr lang="de-DE" smtClean="0"/>
-              <a:t>26.11.23</a:t>
+              <a:t>27.11.23</a:t>
             </a:fld>
             <a:endParaRPr lang="de-DE"/>
           </a:p>
@@ -2396,7 +2397,7 @@
           <a:p>
             <a:fld id="{98C5D0A0-7D22-BE42-9A30-B4115F904EDD}" type="datetimeFigureOut">
               <a:rPr lang="de-DE" smtClean="0"/>
-              <a:t>26.11.23</a:t>
+              <a:t>27.11.23</a:t>
             </a:fld>
             <a:endParaRPr lang="de-DE"/>
           </a:p>
@@ -2684,7 +2685,7 @@
           <a:p>
             <a:fld id="{98C5D0A0-7D22-BE42-9A30-B4115F904EDD}" type="datetimeFigureOut">
               <a:rPr lang="de-DE" smtClean="0"/>
-              <a:t>26.11.23</a:t>
+              <a:t>27.11.23</a:t>
             </a:fld>
             <a:endParaRPr lang="de-DE"/>
           </a:p>
@@ -2925,7 +2926,7 @@
           <a:p>
             <a:fld id="{98C5D0A0-7D22-BE42-9A30-B4115F904EDD}" type="datetimeFigureOut">
               <a:rPr lang="de-DE" smtClean="0"/>
-              <a:t>26.11.23</a:t>
+              <a:t>27.11.23</a:t>
             </a:fld>
             <a:endParaRPr lang="de-DE"/>
           </a:p>
@@ -5663,6 +5664,134 @@
           <p:cNvPr id="2" name="Titel 1">
             <a:extLst>
               <a:ext uri="{FF2B5EF4-FFF2-40B4-BE49-F238E27FC236}">
+                <a16:creationId xmlns:a16="http://schemas.microsoft.com/office/drawing/2014/main" id="{A2133C53-ACA7-77D9-1892-A1D212AB4255}"/>
+              </a:ext>
+            </a:extLst>
+          </p:cNvPr>
+          <p:cNvSpPr>
+            <a:spLocks noGrp="1"/>
+          </p:cNvSpPr>
+          <p:nvPr>
+            <p:ph type="title"/>
+          </p:nvPr>
+        </p:nvSpPr>
+        <p:spPr/>
+        <p:txBody>
+          <a:bodyPr/>
+          <a:lstStyle/>
+          <a:p>
+            <a:r>
+              <a:rPr lang="de-DE" dirty="0" err="1"/>
+              <a:t>Types</a:t>
+            </a:r>
+            <a:r>
+              <a:rPr lang="de-DE" dirty="0"/>
+              <a:t> and </a:t>
+            </a:r>
+            <a:r>
+              <a:rPr lang="de-DE" dirty="0" err="1"/>
+              <a:t>structs</a:t>
+            </a:r>
+            <a:r>
+              <a:rPr lang="de-DE" dirty="0"/>
+              <a:t> </a:t>
+            </a:r>
+            <a:r>
+              <a:rPr lang="de-DE" dirty="0" err="1"/>
+              <a:t>that</a:t>
+            </a:r>
+            <a:r>
+              <a:rPr lang="de-DE" dirty="0"/>
+              <a:t> </a:t>
+            </a:r>
+            <a:r>
+              <a:rPr lang="de-DE" dirty="0" err="1"/>
+              <a:t>implement</a:t>
+            </a:r>
+            <a:r>
+              <a:rPr lang="de-DE" dirty="0"/>
+              <a:t> Responder </a:t>
+            </a:r>
+            <a:r>
+              <a:rPr lang="de-DE" dirty="0" err="1"/>
+              <a:t>by</a:t>
+            </a:r>
+            <a:r>
+              <a:rPr lang="de-DE" dirty="0"/>
+              <a:t> </a:t>
+            </a:r>
+            <a:r>
+              <a:rPr lang="de-DE" dirty="0" err="1"/>
+              <a:t>default</a:t>
+            </a:r>
+            <a:endParaRPr lang="de-AT" dirty="0"/>
+          </a:p>
+        </p:txBody>
+      </p:sp>
+      <p:pic>
+        <p:nvPicPr>
+          <p:cNvPr id="5" name="Inhaltsplatzhalter 4">
+            <a:extLst>
+              <a:ext uri="{FF2B5EF4-FFF2-40B4-BE49-F238E27FC236}">
+                <a16:creationId xmlns:a16="http://schemas.microsoft.com/office/drawing/2014/main" id="{20D04653-4006-179C-3B0C-1691271C92B4}"/>
+              </a:ext>
+            </a:extLst>
+          </p:cNvPr>
+          <p:cNvPicPr>
+            <a:picLocks noGrp="1" noChangeAspect="1"/>
+          </p:cNvPicPr>
+          <p:nvPr>
+            <p:ph idx="1"/>
+          </p:nvPr>
+        </p:nvPicPr>
+        <p:blipFill>
+          <a:blip r:embed="rId2"/>
+          <a:stretch>
+            <a:fillRect/>
+          </a:stretch>
+        </p:blipFill>
+        <p:spPr>
+          <a:xfrm>
+            <a:off x="838199" y="1902598"/>
+            <a:ext cx="8174269" cy="3637063"/>
+          </a:xfrm>
+        </p:spPr>
+      </p:pic>
+    </p:spTree>
+    <p:extLst>
+      <p:ext uri="{BB962C8B-B14F-4D97-AF65-F5344CB8AC3E}">
+        <p14:creationId xmlns:p14="http://schemas.microsoft.com/office/powerpoint/2010/main" val="2410797446"/>
+      </p:ext>
+    </p:extLst>
+  </p:cSld>
+  <p:clrMapOvr>
+    <a:masterClrMapping/>
+  </p:clrMapOvr>
+</p:sld>
+</file>
+
+<file path=ppt/slides/slide11.xml><?xml version="1.0" encoding="utf-8"?>
+<p:sld xmlns:a="http://schemas.openxmlformats.org/drawingml/2006/main" xmlns:r="http://schemas.openxmlformats.org/officeDocument/2006/relationships" xmlns:p="http://schemas.openxmlformats.org/presentationml/2006/main">
+  <p:cSld>
+    <p:spTree>
+      <p:nvGrpSpPr>
+        <p:cNvPr id="1" name=""/>
+        <p:cNvGrpSpPr/>
+        <p:nvPr/>
+      </p:nvGrpSpPr>
+      <p:grpSpPr>
+        <a:xfrm>
+          <a:off x="0" y="0"/>
+          <a:ext cx="0" cy="0"/>
+          <a:chOff x="0" y="0"/>
+          <a:chExt cx="0" cy="0"/>
+        </a:xfrm>
+      </p:grpSpPr>
+      <p:sp>
+        <p:nvSpPr>
+          <p:cNvPr id="2" name="Titel 1">
+            <a:extLst>
+              <a:ext uri="{FF2B5EF4-FFF2-40B4-BE49-F238E27FC236}">
                 <a16:creationId xmlns:a16="http://schemas.microsoft.com/office/drawing/2014/main" id="{DE28BBC6-A8B3-01DD-B469-C9EC43354124}"/>
               </a:ext>
             </a:extLst>
@@ -6246,7 +6375,7 @@
 </p:sld>
 </file>
 
-<file path=ppt/slides/slide11.xml><?xml version="1.0" encoding="utf-8"?>
+<file path=ppt/slides/slide12.xml><?xml version="1.0" encoding="utf-8"?>
 <p:sld xmlns:a="http://schemas.openxmlformats.org/drawingml/2006/main" xmlns:r="http://schemas.openxmlformats.org/officeDocument/2006/relationships" xmlns:p="http://schemas.openxmlformats.org/presentationml/2006/main">
   <p:cSld>
     <p:spTree>
@@ -6535,7 +6664,7 @@
 </p:sld>
 </file>
 
-<file path=ppt/slides/slide12.xml><?xml version="1.0" encoding="utf-8"?>
+<file path=ppt/slides/slide13.xml><?xml version="1.0" encoding="utf-8"?>
 <p:sld xmlns:a="http://schemas.openxmlformats.org/drawingml/2006/main" xmlns:r="http://schemas.openxmlformats.org/officeDocument/2006/relationships" xmlns:p="http://schemas.openxmlformats.org/presentationml/2006/main">
   <p:cSld>
     <p:spTree>
@@ -7199,7 +7328,7 @@
 </p:sld>
 </file>
 
-<file path=ppt/slides/slide13.xml><?xml version="1.0" encoding="utf-8"?>
+<file path=ppt/slides/slide14.xml><?xml version="1.0" encoding="utf-8"?>
 <p:sld xmlns:a="http://schemas.openxmlformats.org/drawingml/2006/main" xmlns:r="http://schemas.openxmlformats.org/officeDocument/2006/relationships" xmlns:p="http://schemas.openxmlformats.org/presentationml/2006/main">
   <p:cSld>
     <p:spTree>
@@ -8143,7 +8272,7 @@
 </p:sld>
 </file>
 
-<file path=ppt/slides/slide14.xml><?xml version="1.0" encoding="utf-8"?>
+<file path=ppt/slides/slide15.xml><?xml version="1.0" encoding="utf-8"?>
 <p:sld xmlns:a="http://schemas.openxmlformats.org/drawingml/2006/main" xmlns:r="http://schemas.openxmlformats.org/officeDocument/2006/relationships" xmlns:p="http://schemas.openxmlformats.org/presentationml/2006/main">
   <p:cSld>
     <p:spTree>
@@ -8425,7 +8554,7 @@
 </p:sld>
 </file>
 
-<file path=ppt/slides/slide15.xml><?xml version="1.0" encoding="utf-8"?>
+<file path=ppt/slides/slide16.xml><?xml version="1.0" encoding="utf-8"?>
 <p:sld xmlns:a="http://schemas.openxmlformats.org/drawingml/2006/main" xmlns:r="http://schemas.openxmlformats.org/officeDocument/2006/relationships" xmlns:p="http://schemas.openxmlformats.org/presentationml/2006/main">
   <p:cSld>
     <p:spTree>
@@ -8871,7 +9000,7 @@
 </p:sld>
 </file>
 
-<file path=ppt/slides/slide16.xml><?xml version="1.0" encoding="utf-8"?>
+<file path=ppt/slides/slide17.xml><?xml version="1.0" encoding="utf-8"?>
 <p:sld xmlns:a="http://schemas.openxmlformats.org/drawingml/2006/main" xmlns:r="http://schemas.openxmlformats.org/officeDocument/2006/relationships" xmlns:p="http://schemas.openxmlformats.org/presentationml/2006/main">
   <p:cSld>
     <p:spTree>
@@ -9004,7 +9133,7 @@
 </p:sld>
 </file>
 
-<file path=ppt/slides/slide17.xml><?xml version="1.0" encoding="utf-8"?>
+<file path=ppt/slides/slide18.xml><?xml version="1.0" encoding="utf-8"?>
 <p:sld xmlns:a="http://schemas.openxmlformats.org/drawingml/2006/main" xmlns:r="http://schemas.openxmlformats.org/officeDocument/2006/relationships" xmlns:p="http://schemas.openxmlformats.org/presentationml/2006/main">
   <p:cSld>
     <p:spTree>
@@ -10934,6 +11063,38 @@
             </a:r>
             <a:r>
               <a:rPr lang="de-DE" sz="2400" dirty="0" err="1"/>
+              <a:t>implements</a:t>
+            </a:r>
+            <a:r>
+              <a:rPr lang="de-DE" sz="2400" dirty="0"/>
+              <a:t> </a:t>
+            </a:r>
+            <a:r>
+              <a:rPr lang="de-DE" sz="2400" dirty="0" err="1"/>
+              <a:t>the</a:t>
+            </a:r>
+            <a:r>
+              <a:rPr lang="de-DE" sz="2400" dirty="0"/>
+              <a:t> Responder </a:t>
+            </a:r>
+            <a:r>
+              <a:rPr lang="de-DE" sz="2400" dirty="0" err="1"/>
+              <a:t>trait</a:t>
+            </a:r>
+            <a:r>
+              <a:rPr lang="de-DE" sz="2400" dirty="0"/>
+              <a:t> (</a:t>
+            </a:r>
+            <a:r>
+              <a:rPr lang="de-DE" sz="2400" dirty="0" err="1"/>
+              <a:t>or</a:t>
+            </a:r>
+            <a:r>
+              <a:rPr lang="de-DE" sz="2400" dirty="0"/>
+              <a:t> </a:t>
+            </a:r>
+            <a:r>
+              <a:rPr lang="de-DE" sz="2400" dirty="0" err="1"/>
               <a:t>can</a:t>
             </a:r>
             <a:r>
@@ -10950,7 +11111,7 @@
             </a:r>
             <a:r>
               <a:rPr lang="de-DE" sz="2400" dirty="0" err="1"/>
-              <a:t>resolved</a:t>
+              <a:t>turned</a:t>
             </a:r>
             <a:r>
               <a:rPr lang="de-DE" sz="2400" dirty="0"/>
@@ -10962,43 +11123,11 @@
             </a:r>
             <a:r>
               <a:rPr lang="de-DE" sz="2400" dirty="0"/>
-              <a:t> a </a:t>
+              <a:t> a valid 	    </a:t>
             </a:r>
             <a:r>
               <a:rPr lang="de-DE" sz="2400" dirty="0" err="1"/>
               <a:t>HttpResponse</a:t>
-            </a:r>
-            <a:r>
-              <a:rPr lang="de-DE" sz="2400" dirty="0"/>
-              <a:t> (e.g. </a:t>
-            </a:r>
-            <a:r>
-              <a:rPr lang="de-DE" sz="2400" dirty="0" err="1"/>
-              <a:t>it</a:t>
-            </a:r>
-            <a:r>
-              <a:rPr lang="de-DE" sz="2400" dirty="0"/>
-              <a:t> </a:t>
-            </a:r>
-            <a:r>
-              <a:rPr lang="de-DE" sz="2400" dirty="0" err="1"/>
-              <a:t>implements</a:t>
-            </a:r>
-            <a:r>
-              <a:rPr lang="de-DE" sz="2400" dirty="0"/>
-              <a:t> </a:t>
-            </a:r>
-            <a:r>
-              <a:rPr lang="de-DE" sz="2400" dirty="0" err="1"/>
-              <a:t>the</a:t>
-            </a:r>
-            <a:r>
-              <a:rPr lang="de-DE" sz="2400" dirty="0"/>
-              <a:t> 	Responder </a:t>
-            </a:r>
-            <a:r>
-              <a:rPr lang="de-DE" sz="2400" dirty="0" err="1"/>
-              <a:t>trait</a:t>
             </a:r>
             <a:r>
               <a:rPr lang="de-DE" sz="2400" dirty="0"/>
@@ -11556,6 +11685,571 @@
           <p:cNvPr id="2" name="Titel 1">
             <a:extLst>
               <a:ext uri="{FF2B5EF4-FFF2-40B4-BE49-F238E27FC236}">
+                <a16:creationId xmlns:a16="http://schemas.microsoft.com/office/drawing/2014/main" id="{46D4EC42-ECB0-F4B6-2482-FA1A2C58CE6F}"/>
+              </a:ext>
+            </a:extLst>
+          </p:cNvPr>
+          <p:cNvSpPr>
+            <a:spLocks noGrp="1"/>
+          </p:cNvSpPr>
+          <p:nvPr>
+            <p:ph type="title"/>
+          </p:nvPr>
+        </p:nvSpPr>
+        <p:spPr/>
+        <p:txBody>
+          <a:bodyPr/>
+          <a:lstStyle/>
+          <a:p>
+            <a:r>
+              <a:rPr lang="de-DE" dirty="0"/>
+              <a:t>Register </a:t>
+            </a:r>
+            <a:r>
+              <a:rPr lang="de-DE" dirty="0" err="1"/>
+              <a:t>routes</a:t>
+            </a:r>
+            <a:endParaRPr lang="de-DE" dirty="0"/>
+          </a:p>
+        </p:txBody>
+      </p:sp>
+      <p:sp>
+        <p:nvSpPr>
+          <p:cNvPr id="3" name="Inhaltsplatzhalter 2">
+            <a:extLst>
+              <a:ext uri="{FF2B5EF4-FFF2-40B4-BE49-F238E27FC236}">
+                <a16:creationId xmlns:a16="http://schemas.microsoft.com/office/drawing/2014/main" id="{06AFE83A-C1DB-68D6-1074-3DF6C1C728B1}"/>
+              </a:ext>
+            </a:extLst>
+          </p:cNvPr>
+          <p:cNvSpPr>
+            <a:spLocks noGrp="1"/>
+          </p:cNvSpPr>
+          <p:nvPr>
+            <p:ph idx="1"/>
+          </p:nvPr>
+        </p:nvSpPr>
+        <p:spPr/>
+        <p:txBody>
+          <a:bodyPr/>
+          <a:lstStyle/>
+          <a:p>
+            <a:pPr marL="0" indent="0">
+              <a:buNone/>
+            </a:pPr>
+            <a:r>
+              <a:rPr lang="de-DE" dirty="0" err="1"/>
+              <a:t>provides</a:t>
+            </a:r>
+            <a:r>
+              <a:rPr lang="de-DE" dirty="0"/>
+              <a:t> </a:t>
+            </a:r>
+            <a:r>
+              <a:rPr lang="de-DE" dirty="0" err="1"/>
+              <a:t>useful</a:t>
+            </a:r>
+            <a:r>
+              <a:rPr lang="de-DE" dirty="0"/>
+              <a:t> </a:t>
+            </a:r>
+            <a:r>
+              <a:rPr lang="de-DE" dirty="0" err="1"/>
+              <a:t>tools</a:t>
+            </a:r>
+            <a:r>
+              <a:rPr lang="de-DE" dirty="0"/>
+              <a:t> </a:t>
+            </a:r>
+            <a:r>
+              <a:rPr lang="de-DE" dirty="0" err="1"/>
+              <a:t>for</a:t>
+            </a:r>
+            <a:r>
+              <a:rPr lang="de-DE" dirty="0"/>
+              <a:t> </a:t>
+            </a:r>
+            <a:r>
+              <a:rPr lang="de-DE" dirty="0" err="1"/>
+              <a:t>registering</a:t>
+            </a:r>
+            <a:r>
+              <a:rPr lang="de-DE" dirty="0"/>
+              <a:t> </a:t>
+            </a:r>
+            <a:r>
+              <a:rPr lang="de-DE" dirty="0" err="1"/>
+              <a:t>routes</a:t>
+            </a:r>
+            <a:r>
+              <a:rPr lang="de-DE" dirty="0"/>
+              <a:t> and </a:t>
+            </a:r>
+            <a:r>
+              <a:rPr lang="de-DE" dirty="0" err="1"/>
+              <a:t>for</a:t>
+            </a:r>
+            <a:r>
+              <a:rPr lang="de-DE" dirty="0"/>
+              <a:t> </a:t>
+            </a:r>
+            <a:r>
+              <a:rPr lang="de-DE" dirty="0" err="1"/>
+              <a:t>extracting</a:t>
+            </a:r>
+            <a:r>
+              <a:rPr lang="de-DE" dirty="0"/>
+              <a:t> </a:t>
+            </a:r>
+            <a:r>
+              <a:rPr lang="de-DE" dirty="0" err="1"/>
+              <a:t>data</a:t>
+            </a:r>
+            <a:r>
+              <a:rPr lang="de-DE" dirty="0"/>
+              <a:t> </a:t>
+            </a:r>
+            <a:r>
+              <a:rPr lang="de-DE" dirty="0" err="1"/>
+              <a:t>from</a:t>
+            </a:r>
+            <a:r>
+              <a:rPr lang="de-DE" dirty="0"/>
+              <a:t> </a:t>
+            </a:r>
+            <a:r>
+              <a:rPr lang="de-DE" dirty="0" err="1"/>
+              <a:t>request</a:t>
+            </a:r>
+            <a:endParaRPr lang="de-DE" dirty="0"/>
+          </a:p>
+          <a:p>
+            <a:pPr marL="0" indent="0">
+              <a:buNone/>
+            </a:pPr>
+            <a:endParaRPr lang="de-DE" dirty="0"/>
+          </a:p>
+          <a:p>
+            <a:pPr marL="0" indent="0">
+              <a:buNone/>
+            </a:pPr>
+            <a:r>
+              <a:rPr lang="de-AT" sz="2000" b="0" dirty="0">
+                <a:solidFill>
+                  <a:srgbClr val="4EC9B0"/>
+                </a:solidFill>
+                <a:effectLst/>
+                <a:latin typeface="Menlo" panose="020B0609030804020204" pitchFamily="49" charset="0"/>
+              </a:rPr>
+              <a:t>web</a:t>
+            </a:r>
+            <a:r>
+              <a:rPr lang="de-AT" sz="2000" b="0" dirty="0">
+                <a:solidFill>
+                  <a:srgbClr val="D4D4D4"/>
+                </a:solidFill>
+                <a:effectLst/>
+                <a:latin typeface="Menlo" panose="020B0609030804020204" pitchFamily="49" charset="0"/>
+              </a:rPr>
+              <a:t>::</a:t>
+            </a:r>
+            <a:r>
+              <a:rPr lang="de-AT" sz="2000" b="0" dirty="0" err="1">
+                <a:solidFill>
+                  <a:srgbClr val="DCDCAA"/>
+                </a:solidFill>
+                <a:effectLst/>
+                <a:latin typeface="Menlo" panose="020B0609030804020204" pitchFamily="49" charset="0"/>
+              </a:rPr>
+              <a:t>to</a:t>
+            </a:r>
+            <a:r>
+              <a:rPr lang="de-AT" sz="2000" b="0" dirty="0">
+                <a:solidFill>
+                  <a:srgbClr val="CCCCCC"/>
+                </a:solidFill>
+                <a:effectLst/>
+                <a:latin typeface="Menlo" panose="020B0609030804020204" pitchFamily="49" charset="0"/>
+              </a:rPr>
+              <a:t>(</a:t>
+            </a:r>
+            <a:r>
+              <a:rPr lang="de-AT" sz="2000" b="0" dirty="0" err="1">
+                <a:solidFill>
+                  <a:srgbClr val="DCDCAA"/>
+                </a:solidFill>
+                <a:effectLst/>
+                <a:latin typeface="Menlo" panose="020B0609030804020204" pitchFamily="49" charset="0"/>
+              </a:rPr>
+              <a:t>handler_fn</a:t>
+            </a:r>
+            <a:r>
+              <a:rPr lang="de-AT" sz="2000" b="0" dirty="0">
+                <a:solidFill>
+                  <a:srgbClr val="CCCCCC"/>
+                </a:solidFill>
+                <a:effectLst/>
+                <a:latin typeface="Menlo" panose="020B0609030804020204" pitchFamily="49" charset="0"/>
+              </a:rPr>
+              <a:t>) // </a:t>
+            </a:r>
+            <a:r>
+              <a:rPr lang="de-AT" sz="2000" b="0" dirty="0" err="1">
+                <a:solidFill>
+                  <a:srgbClr val="CCCCCC"/>
+                </a:solidFill>
+                <a:effectLst/>
+                <a:latin typeface="Menlo" panose="020B0609030804020204" pitchFamily="49" charset="0"/>
+              </a:rPr>
+              <a:t>any</a:t>
+            </a:r>
+            <a:r>
+              <a:rPr lang="de-AT" sz="2000" b="0" dirty="0">
+                <a:solidFill>
+                  <a:srgbClr val="CCCCCC"/>
+                </a:solidFill>
+                <a:effectLst/>
+                <a:latin typeface="Menlo" panose="020B0609030804020204" pitchFamily="49" charset="0"/>
+              </a:rPr>
+              <a:t> </a:t>
+            </a:r>
+            <a:r>
+              <a:rPr lang="de-AT" sz="2000" b="0" dirty="0" err="1">
+                <a:solidFill>
+                  <a:srgbClr val="CCCCCC"/>
+                </a:solidFill>
+                <a:effectLst/>
+                <a:latin typeface="Menlo" panose="020B0609030804020204" pitchFamily="49" charset="0"/>
+              </a:rPr>
+              <a:t>method</a:t>
+            </a:r>
+            <a:r>
+              <a:rPr lang="de-AT" sz="2000" b="0" dirty="0">
+                <a:solidFill>
+                  <a:srgbClr val="CCCCCC"/>
+                </a:solidFill>
+                <a:effectLst/>
+                <a:latin typeface="Menlo" panose="020B0609030804020204" pitchFamily="49" charset="0"/>
+              </a:rPr>
+              <a:t> </a:t>
+            </a:r>
+            <a:r>
+              <a:rPr lang="de-AT" sz="2000" b="0" dirty="0" err="1">
+                <a:solidFill>
+                  <a:srgbClr val="CCCCCC"/>
+                </a:solidFill>
+                <a:effectLst/>
+                <a:latin typeface="Menlo" panose="020B0609030804020204" pitchFamily="49" charset="0"/>
+              </a:rPr>
+              <a:t>is</a:t>
+            </a:r>
+            <a:r>
+              <a:rPr lang="de-AT" sz="2000" b="0" dirty="0">
+                <a:solidFill>
+                  <a:srgbClr val="CCCCCC"/>
+                </a:solidFill>
+                <a:effectLst/>
+                <a:latin typeface="Menlo" panose="020B0609030804020204" pitchFamily="49" charset="0"/>
+              </a:rPr>
+              <a:t> </a:t>
+            </a:r>
+            <a:r>
+              <a:rPr lang="de-AT" sz="2000" b="0" dirty="0" err="1">
+                <a:solidFill>
+                  <a:srgbClr val="CCCCCC"/>
+                </a:solidFill>
+                <a:effectLst/>
+                <a:latin typeface="Menlo" panose="020B0609030804020204" pitchFamily="49" charset="0"/>
+              </a:rPr>
+              <a:t>allowed</a:t>
+            </a:r>
+            <a:endParaRPr lang="de-AT" sz="2000" b="0" dirty="0">
+              <a:solidFill>
+                <a:srgbClr val="4EC9B0"/>
+              </a:solidFill>
+              <a:effectLst/>
+              <a:latin typeface="Menlo" panose="020B0609030804020204" pitchFamily="49" charset="0"/>
+            </a:endParaRPr>
+          </a:p>
+          <a:p>
+            <a:pPr marL="0" indent="0">
+              <a:buNone/>
+            </a:pPr>
+            <a:r>
+              <a:rPr lang="de-AT" sz="2000" b="0" dirty="0">
+                <a:solidFill>
+                  <a:srgbClr val="4EC9B0"/>
+                </a:solidFill>
+                <a:effectLst/>
+                <a:latin typeface="Menlo" panose="020B0609030804020204" pitchFamily="49" charset="0"/>
+              </a:rPr>
+              <a:t>web</a:t>
+            </a:r>
+            <a:r>
+              <a:rPr lang="de-AT" sz="2000" b="0" dirty="0">
+                <a:solidFill>
+                  <a:srgbClr val="D4D4D4"/>
+                </a:solidFill>
+                <a:effectLst/>
+                <a:latin typeface="Menlo" panose="020B0609030804020204" pitchFamily="49" charset="0"/>
+              </a:rPr>
+              <a:t>::</a:t>
+            </a:r>
+            <a:r>
+              <a:rPr lang="de-AT" sz="2000" b="0" dirty="0" err="1">
+                <a:solidFill>
+                  <a:srgbClr val="DCDCAA"/>
+                </a:solidFill>
+                <a:effectLst/>
+                <a:latin typeface="Menlo" panose="020B0609030804020204" pitchFamily="49" charset="0"/>
+              </a:rPr>
+              <a:t>get</a:t>
+            </a:r>
+            <a:r>
+              <a:rPr lang="de-AT" sz="2000" b="0" dirty="0">
+                <a:solidFill>
+                  <a:srgbClr val="CCCCCC"/>
+                </a:solidFill>
+                <a:effectLst/>
+                <a:latin typeface="Menlo" panose="020B0609030804020204" pitchFamily="49" charset="0"/>
+              </a:rPr>
+              <a:t>()</a:t>
+            </a:r>
+            <a:r>
+              <a:rPr lang="de-AT" sz="2000" b="0" dirty="0">
+                <a:solidFill>
+                  <a:srgbClr val="D4D4D4"/>
+                </a:solidFill>
+                <a:effectLst/>
+                <a:latin typeface="Menlo" panose="020B0609030804020204" pitchFamily="49" charset="0"/>
+              </a:rPr>
+              <a:t>.</a:t>
+            </a:r>
+            <a:r>
+              <a:rPr lang="de-AT" sz="2000" b="0" dirty="0" err="1">
+                <a:solidFill>
+                  <a:srgbClr val="DCDCAA"/>
+                </a:solidFill>
+                <a:effectLst/>
+                <a:latin typeface="Menlo" panose="020B0609030804020204" pitchFamily="49" charset="0"/>
+              </a:rPr>
+              <a:t>to</a:t>
+            </a:r>
+            <a:r>
+              <a:rPr lang="de-AT" sz="2000" b="0" dirty="0">
+                <a:solidFill>
+                  <a:srgbClr val="CCCCCC"/>
+                </a:solidFill>
+                <a:effectLst/>
+                <a:latin typeface="Menlo" panose="020B0609030804020204" pitchFamily="49" charset="0"/>
+              </a:rPr>
+              <a:t>(</a:t>
+            </a:r>
+            <a:r>
+              <a:rPr lang="de-AT" sz="2000" b="0" dirty="0" err="1">
+                <a:solidFill>
+                  <a:srgbClr val="DCDCAA"/>
+                </a:solidFill>
+                <a:effectLst/>
+                <a:latin typeface="Menlo" panose="020B0609030804020204" pitchFamily="49" charset="0"/>
+              </a:rPr>
+              <a:t>handler_fn</a:t>
+            </a:r>
+            <a:r>
+              <a:rPr lang="de-AT" sz="2000" b="0" dirty="0">
+                <a:solidFill>
+                  <a:srgbClr val="CCCCCC"/>
+                </a:solidFill>
+                <a:effectLst/>
+                <a:latin typeface="Menlo" panose="020B0609030804020204" pitchFamily="49" charset="0"/>
+              </a:rPr>
+              <a:t>) // </a:t>
+            </a:r>
+            <a:r>
+              <a:rPr lang="de-AT" sz="2000" b="0" dirty="0" err="1">
+                <a:solidFill>
+                  <a:srgbClr val="CCCCCC"/>
+                </a:solidFill>
+                <a:effectLst/>
+                <a:latin typeface="Menlo" panose="020B0609030804020204" pitchFamily="49" charset="0"/>
+              </a:rPr>
+              <a:t>only</a:t>
+            </a:r>
+            <a:r>
+              <a:rPr lang="de-AT" sz="2000" b="0" dirty="0">
+                <a:solidFill>
+                  <a:srgbClr val="CCCCCC"/>
+                </a:solidFill>
+                <a:effectLst/>
+                <a:latin typeface="Menlo" panose="020B0609030804020204" pitchFamily="49" charset="0"/>
+              </a:rPr>
+              <a:t> </a:t>
+            </a:r>
+            <a:r>
+              <a:rPr lang="de-AT" sz="2000" b="0" dirty="0" err="1">
+                <a:solidFill>
+                  <a:srgbClr val="CCCCCC"/>
+                </a:solidFill>
+                <a:effectLst/>
+                <a:latin typeface="Menlo" panose="020B0609030804020204" pitchFamily="49" charset="0"/>
+              </a:rPr>
+              <a:t>get</a:t>
+            </a:r>
+            <a:r>
+              <a:rPr lang="de-AT" sz="2000" b="0" dirty="0">
+                <a:solidFill>
+                  <a:srgbClr val="CCCCCC"/>
+                </a:solidFill>
+                <a:effectLst/>
+                <a:latin typeface="Menlo" panose="020B0609030804020204" pitchFamily="49" charset="0"/>
+              </a:rPr>
+              <a:t> </a:t>
+            </a:r>
+            <a:r>
+              <a:rPr lang="de-AT" sz="2000" b="0" dirty="0" err="1">
+                <a:solidFill>
+                  <a:srgbClr val="CCCCCC"/>
+                </a:solidFill>
+                <a:effectLst/>
+                <a:latin typeface="Menlo" panose="020B0609030804020204" pitchFamily="49" charset="0"/>
+              </a:rPr>
+              <a:t>method</a:t>
+            </a:r>
+            <a:r>
+              <a:rPr lang="de-AT" sz="2000" b="0" dirty="0">
+                <a:solidFill>
+                  <a:srgbClr val="CCCCCC"/>
+                </a:solidFill>
+                <a:effectLst/>
+                <a:latin typeface="Menlo" panose="020B0609030804020204" pitchFamily="49" charset="0"/>
+              </a:rPr>
+              <a:t> </a:t>
+            </a:r>
+            <a:r>
+              <a:rPr lang="de-AT" sz="2000" b="0" dirty="0" err="1">
+                <a:solidFill>
+                  <a:srgbClr val="CCCCCC"/>
+                </a:solidFill>
+                <a:effectLst/>
+                <a:latin typeface="Menlo" panose="020B0609030804020204" pitchFamily="49" charset="0"/>
+              </a:rPr>
+              <a:t>is</a:t>
+            </a:r>
+            <a:r>
+              <a:rPr lang="de-AT" sz="2000" b="0" dirty="0">
+                <a:solidFill>
+                  <a:srgbClr val="CCCCCC"/>
+                </a:solidFill>
+                <a:effectLst/>
+                <a:latin typeface="Menlo" panose="020B0609030804020204" pitchFamily="49" charset="0"/>
+              </a:rPr>
+              <a:t> </a:t>
+            </a:r>
+            <a:r>
+              <a:rPr lang="de-AT" sz="2000" b="0" dirty="0" err="1">
+                <a:solidFill>
+                  <a:srgbClr val="CCCCCC"/>
+                </a:solidFill>
+                <a:effectLst/>
+                <a:latin typeface="Menlo" panose="020B0609030804020204" pitchFamily="49" charset="0"/>
+              </a:rPr>
+              <a:t>allowed</a:t>
+            </a:r>
+            <a:endParaRPr lang="de-AT" sz="2000" b="0" dirty="0">
+              <a:solidFill>
+                <a:srgbClr val="CCCCCC"/>
+              </a:solidFill>
+              <a:effectLst/>
+              <a:latin typeface="Menlo" panose="020B0609030804020204" pitchFamily="49" charset="0"/>
+            </a:endParaRPr>
+          </a:p>
+          <a:p>
+            <a:pPr marL="0" indent="0">
+              <a:buNone/>
+            </a:pPr>
+            <a:endParaRPr lang="de-AT" sz="2000" b="0" dirty="0">
+              <a:solidFill>
+                <a:srgbClr val="CCCCCC"/>
+              </a:solidFill>
+              <a:effectLst/>
+              <a:latin typeface="Menlo" panose="020B0609030804020204" pitchFamily="49" charset="0"/>
+            </a:endParaRPr>
+          </a:p>
+          <a:p>
+            <a:pPr marL="0" indent="0">
+              <a:buNone/>
+            </a:pPr>
+            <a:r>
+              <a:rPr lang="de-DE" dirty="0"/>
+              <a:t>… </a:t>
+            </a:r>
+            <a:r>
+              <a:rPr lang="de-DE" dirty="0" err="1"/>
+              <a:t>or</a:t>
+            </a:r>
+            <a:r>
+              <a:rPr lang="de-DE" dirty="0"/>
+              <a:t> </a:t>
+            </a:r>
+            <a:r>
+              <a:rPr lang="de-DE" dirty="0" err="1"/>
+              <a:t>use</a:t>
+            </a:r>
+            <a:r>
+              <a:rPr lang="de-DE" dirty="0"/>
+              <a:t> a </a:t>
+            </a:r>
+            <a:r>
+              <a:rPr lang="de-DE" dirty="0" err="1"/>
+              <a:t>procedural</a:t>
+            </a:r>
+            <a:r>
+              <a:rPr lang="de-DE" dirty="0"/>
+              <a:t> </a:t>
+            </a:r>
+            <a:r>
+              <a:rPr lang="de-DE" dirty="0" err="1"/>
+              <a:t>macro</a:t>
+            </a:r>
+            <a:endParaRPr lang="de-DE" dirty="0"/>
+          </a:p>
+        </p:txBody>
+      </p:sp>
+    </p:spTree>
+    <p:extLst>
+      <p:ext uri="{BB962C8B-B14F-4D97-AF65-F5344CB8AC3E}">
+        <p14:creationId xmlns:p14="http://schemas.microsoft.com/office/powerpoint/2010/main" val="3940972417"/>
+      </p:ext>
+    </p:extLst>
+  </p:cSld>
+  <p:clrMapOvr>
+    <a:masterClrMapping/>
+  </p:clrMapOvr>
+</p:sld>
+</file>
+
+<file path=ppt/slides/slide9.xml><?xml version="1.0" encoding="utf-8"?>
+<p:sld xmlns:a="http://schemas.openxmlformats.org/drawingml/2006/main" xmlns:r="http://schemas.openxmlformats.org/officeDocument/2006/relationships" xmlns:p="http://schemas.openxmlformats.org/presentationml/2006/main">
+  <p:cSld>
+    <p:spTree>
+      <p:nvGrpSpPr>
+        <p:cNvPr id="1" name=""/>
+        <p:cNvGrpSpPr/>
+        <p:nvPr/>
+      </p:nvGrpSpPr>
+      <p:grpSpPr>
+        <a:xfrm>
+          <a:off x="0" y="0"/>
+          <a:ext cx="0" cy="0"/>
+          <a:chOff x="0" y="0"/>
+          <a:chExt cx="0" cy="0"/>
+        </a:xfrm>
+      </p:grpSpPr>
+      <p:sp>
+        <p:nvSpPr>
+          <p:cNvPr id="2" name="Titel 1">
+            <a:extLst>
+              <a:ext uri="{FF2B5EF4-FFF2-40B4-BE49-F238E27FC236}">
                 <a16:creationId xmlns:a16="http://schemas.microsoft.com/office/drawing/2014/main" id="{AB0AF7AC-96AA-F168-C11F-5BBBFBE1A7BE}"/>
               </a:ext>
             </a:extLst>
@@ -11643,8 +12337,8 @@
         </p:nvSpPr>
         <p:spPr>
           <a:xfrm>
-            <a:off x="2361460" y="3737499"/>
-            <a:ext cx="5051394" cy="204186"/>
+            <a:off x="2114550" y="3737499"/>
+            <a:ext cx="2451100" cy="204186"/>
           </a:xfrm>
           <a:prstGeom prst="rightArrow">
             <a:avLst/>
@@ -11689,8 +12383,8 @@
         </p:nvSpPr>
         <p:spPr>
           <a:xfrm>
-            <a:off x="7775591" y="3506680"/>
-            <a:ext cx="3463541" cy="923330"/>
+            <a:off x="4681477" y="3737499"/>
+            <a:ext cx="7023887" cy="1446550"/>
           </a:xfrm>
           <a:prstGeom prst="rect">
             <a:avLst/>
@@ -11801,140 +12495,207 @@
             </a:r>
             <a:endParaRPr lang="de-DE" dirty="0"/>
           </a:p>
+          <a:p>
+            <a:endParaRPr lang="de-DE" dirty="0"/>
+          </a:p>
+          <a:p>
+            <a:r>
+              <a:rPr lang="de-AT" sz="1600" b="0" dirty="0" err="1">
+                <a:solidFill>
+                  <a:srgbClr val="569CD6"/>
+                </a:solidFill>
+                <a:effectLst/>
+                <a:latin typeface="Menlo" panose="020B0609030804020204" pitchFamily="49" charset="0"/>
+              </a:rPr>
+              <a:t>fn</a:t>
+            </a:r>
+            <a:r>
+              <a:rPr lang="de-AT" sz="1600" b="0" dirty="0">
+                <a:solidFill>
+                  <a:srgbClr val="CCCCCC"/>
+                </a:solidFill>
+                <a:effectLst/>
+                <a:latin typeface="Menlo" panose="020B0609030804020204" pitchFamily="49" charset="0"/>
+              </a:rPr>
+              <a:t> </a:t>
+            </a:r>
+            <a:r>
+              <a:rPr lang="de-AT" sz="1600" b="0" dirty="0" err="1">
+                <a:solidFill>
+                  <a:srgbClr val="DCDCAA"/>
+                </a:solidFill>
+                <a:effectLst/>
+                <a:latin typeface="Menlo" panose="020B0609030804020204" pitchFamily="49" charset="0"/>
+              </a:rPr>
+              <a:t>get_params</a:t>
+            </a:r>
+            <a:r>
+              <a:rPr lang="de-AT" sz="1600" b="0" dirty="0">
+                <a:solidFill>
+                  <a:srgbClr val="CCCCCC"/>
+                </a:solidFill>
+                <a:effectLst/>
+                <a:latin typeface="Menlo" panose="020B0609030804020204" pitchFamily="49" charset="0"/>
+              </a:rPr>
+              <a:t>(</a:t>
+            </a:r>
+            <a:r>
+              <a:rPr lang="de-AT" sz="1600" b="0" dirty="0" err="1">
+                <a:solidFill>
+                  <a:srgbClr val="9CDCFE"/>
+                </a:solidFill>
+                <a:effectLst/>
+                <a:latin typeface="Menlo" panose="020B0609030804020204" pitchFamily="49" charset="0"/>
+              </a:rPr>
+              <a:t>info</a:t>
+            </a:r>
+            <a:r>
+              <a:rPr lang="de-AT" sz="1600" b="0" dirty="0">
+                <a:solidFill>
+                  <a:srgbClr val="D4D4D4"/>
+                </a:solidFill>
+                <a:effectLst/>
+                <a:latin typeface="Menlo" panose="020B0609030804020204" pitchFamily="49" charset="0"/>
+              </a:rPr>
+              <a:t>:</a:t>
+            </a:r>
+            <a:r>
+              <a:rPr lang="de-AT" sz="1600" b="0" dirty="0">
+                <a:solidFill>
+                  <a:srgbClr val="CCCCCC"/>
+                </a:solidFill>
+                <a:effectLst/>
+                <a:latin typeface="Menlo" panose="020B0609030804020204" pitchFamily="49" charset="0"/>
+              </a:rPr>
+              <a:t> </a:t>
+            </a:r>
+            <a:r>
+              <a:rPr lang="de-AT" sz="1600" b="0" dirty="0">
+                <a:solidFill>
+                  <a:srgbClr val="4EC9B0"/>
+                </a:solidFill>
+                <a:effectLst/>
+                <a:latin typeface="Menlo" panose="020B0609030804020204" pitchFamily="49" charset="0"/>
+              </a:rPr>
+              <a:t>web</a:t>
+            </a:r>
+            <a:r>
+              <a:rPr lang="de-AT" sz="1600" b="0" dirty="0">
+                <a:solidFill>
+                  <a:srgbClr val="D4D4D4"/>
+                </a:solidFill>
+                <a:effectLst/>
+                <a:latin typeface="Menlo" panose="020B0609030804020204" pitchFamily="49" charset="0"/>
+              </a:rPr>
+              <a:t>::</a:t>
+            </a:r>
+            <a:r>
+              <a:rPr lang="de-AT" sz="1600" b="0" dirty="0">
+                <a:solidFill>
+                  <a:srgbClr val="4EC9B0"/>
+                </a:solidFill>
+                <a:effectLst/>
+                <a:latin typeface="Menlo" panose="020B0609030804020204" pitchFamily="49" charset="0"/>
+              </a:rPr>
+              <a:t>Query</a:t>
+            </a:r>
+            <a:r>
+              <a:rPr lang="de-AT" sz="1600" b="0" dirty="0">
+                <a:solidFill>
+                  <a:srgbClr val="CCCCCC"/>
+                </a:solidFill>
+                <a:effectLst/>
+                <a:latin typeface="Menlo" panose="020B0609030804020204" pitchFamily="49" charset="0"/>
+              </a:rPr>
+              <a:t>&lt;</a:t>
+            </a:r>
+            <a:r>
+              <a:rPr lang="de-AT" sz="1600" b="0" dirty="0">
+                <a:solidFill>
+                  <a:srgbClr val="4EC9B0"/>
+                </a:solidFill>
+                <a:effectLst/>
+                <a:latin typeface="Menlo" panose="020B0609030804020204" pitchFamily="49" charset="0"/>
+              </a:rPr>
+              <a:t>Info</a:t>
+            </a:r>
+            <a:r>
+              <a:rPr lang="de-AT" sz="1600" b="0" dirty="0">
+                <a:solidFill>
+                  <a:srgbClr val="CCCCCC"/>
+                </a:solidFill>
+                <a:effectLst/>
+                <a:latin typeface="Menlo" panose="020B0609030804020204" pitchFamily="49" charset="0"/>
+              </a:rPr>
+              <a:t>&gt;) </a:t>
+            </a:r>
+            <a:r>
+              <a:rPr lang="de-AT" sz="1600" b="0" dirty="0">
+                <a:solidFill>
+                  <a:srgbClr val="D4D4D4"/>
+                </a:solidFill>
+                <a:effectLst/>
+                <a:latin typeface="Menlo" panose="020B0609030804020204" pitchFamily="49" charset="0"/>
+              </a:rPr>
+              <a:t>-&gt;</a:t>
+            </a:r>
+            <a:r>
+              <a:rPr lang="de-AT" sz="1600" b="0" dirty="0">
+                <a:solidFill>
+                  <a:srgbClr val="CCCCCC"/>
+                </a:solidFill>
+                <a:effectLst/>
+                <a:latin typeface="Menlo" panose="020B0609030804020204" pitchFamily="49" charset="0"/>
+              </a:rPr>
+              <a:t> </a:t>
+            </a:r>
+            <a:r>
+              <a:rPr lang="de-AT" sz="1600" b="0" dirty="0" err="1">
+                <a:solidFill>
+                  <a:srgbClr val="569CD6"/>
+                </a:solidFill>
+                <a:effectLst/>
+                <a:latin typeface="Menlo" panose="020B0609030804020204" pitchFamily="49" charset="0"/>
+              </a:rPr>
+              <a:t>impl</a:t>
+            </a:r>
+            <a:r>
+              <a:rPr lang="de-AT" sz="1600" b="0" dirty="0">
+                <a:solidFill>
+                  <a:srgbClr val="CCCCCC"/>
+                </a:solidFill>
+                <a:effectLst/>
+                <a:latin typeface="Menlo" panose="020B0609030804020204" pitchFamily="49" charset="0"/>
+              </a:rPr>
+              <a:t> </a:t>
+            </a:r>
+            <a:r>
+              <a:rPr lang="de-AT" sz="1600" b="0" dirty="0">
+                <a:solidFill>
+                  <a:srgbClr val="4EC9B0"/>
+                </a:solidFill>
+                <a:effectLst/>
+                <a:latin typeface="Menlo" panose="020B0609030804020204" pitchFamily="49" charset="0"/>
+              </a:rPr>
+              <a:t>Responder</a:t>
+            </a:r>
+            <a:endParaRPr lang="de-AT" sz="1600" b="0" dirty="0">
+              <a:solidFill>
+                <a:srgbClr val="CCCCCC"/>
+              </a:solidFill>
+              <a:effectLst/>
+              <a:latin typeface="Menlo" panose="020B0609030804020204" pitchFamily="49" charset="0"/>
+            </a:endParaRPr>
+          </a:p>
+          <a:p>
+            <a:endParaRPr lang="de-DE" dirty="0"/>
+          </a:p>
         </p:txBody>
       </p:sp>
     </p:spTree>
     <p:extLst>
       <p:ext uri="{BB962C8B-B14F-4D97-AF65-F5344CB8AC3E}">
         <p14:creationId xmlns:p14="http://schemas.microsoft.com/office/powerpoint/2010/main" val="3208059671"/>
-      </p:ext>
-    </p:extLst>
-  </p:cSld>
-  <p:clrMapOvr>
-    <a:masterClrMapping/>
-  </p:clrMapOvr>
-</p:sld>
-</file>
-
-<file path=ppt/slides/slide9.xml><?xml version="1.0" encoding="utf-8"?>
-<p:sld xmlns:a="http://schemas.openxmlformats.org/drawingml/2006/main" xmlns:r="http://schemas.openxmlformats.org/officeDocument/2006/relationships" xmlns:p="http://schemas.openxmlformats.org/presentationml/2006/main">
-  <p:cSld>
-    <p:spTree>
-      <p:nvGrpSpPr>
-        <p:cNvPr id="1" name=""/>
-        <p:cNvGrpSpPr/>
-        <p:nvPr/>
-      </p:nvGrpSpPr>
-      <p:grpSpPr>
-        <a:xfrm>
-          <a:off x="0" y="0"/>
-          <a:ext cx="0" cy="0"/>
-          <a:chOff x="0" y="0"/>
-          <a:chExt cx="0" cy="0"/>
-        </a:xfrm>
-      </p:grpSpPr>
-      <p:sp>
-        <p:nvSpPr>
-          <p:cNvPr id="2" name="Titel 1">
-            <a:extLst>
-              <a:ext uri="{FF2B5EF4-FFF2-40B4-BE49-F238E27FC236}">
-                <a16:creationId xmlns:a16="http://schemas.microsoft.com/office/drawing/2014/main" id="{A2133C53-ACA7-77D9-1892-A1D212AB4255}"/>
-              </a:ext>
-            </a:extLst>
-          </p:cNvPr>
-          <p:cNvSpPr>
-            <a:spLocks noGrp="1"/>
-          </p:cNvSpPr>
-          <p:nvPr>
-            <p:ph type="title"/>
-          </p:nvPr>
-        </p:nvSpPr>
-        <p:spPr/>
-        <p:txBody>
-          <a:bodyPr/>
-          <a:lstStyle/>
-          <a:p>
-            <a:r>
-              <a:rPr lang="de-DE" dirty="0" err="1"/>
-              <a:t>Types</a:t>
-            </a:r>
-            <a:r>
-              <a:rPr lang="de-DE" dirty="0"/>
-              <a:t> and </a:t>
-            </a:r>
-            <a:r>
-              <a:rPr lang="de-DE" dirty="0" err="1"/>
-              <a:t>structs</a:t>
-            </a:r>
-            <a:r>
-              <a:rPr lang="de-DE" dirty="0"/>
-              <a:t> </a:t>
-            </a:r>
-            <a:r>
-              <a:rPr lang="de-DE" dirty="0" err="1"/>
-              <a:t>that</a:t>
-            </a:r>
-            <a:r>
-              <a:rPr lang="de-DE" dirty="0"/>
-              <a:t> </a:t>
-            </a:r>
-            <a:r>
-              <a:rPr lang="de-DE" dirty="0" err="1"/>
-              <a:t>implement</a:t>
-            </a:r>
-            <a:r>
-              <a:rPr lang="de-DE" dirty="0"/>
-              <a:t> Responder </a:t>
-            </a:r>
-            <a:r>
-              <a:rPr lang="de-DE" dirty="0" err="1"/>
-              <a:t>by</a:t>
-            </a:r>
-            <a:r>
-              <a:rPr lang="de-DE" dirty="0"/>
-              <a:t> </a:t>
-            </a:r>
-            <a:r>
-              <a:rPr lang="de-DE" dirty="0" err="1"/>
-              <a:t>default</a:t>
-            </a:r>
-            <a:endParaRPr lang="de-AT" dirty="0"/>
-          </a:p>
-        </p:txBody>
-      </p:sp>
-      <p:pic>
-        <p:nvPicPr>
-          <p:cNvPr id="5" name="Inhaltsplatzhalter 4">
-            <a:extLst>
-              <a:ext uri="{FF2B5EF4-FFF2-40B4-BE49-F238E27FC236}">
-                <a16:creationId xmlns:a16="http://schemas.microsoft.com/office/drawing/2014/main" id="{20D04653-4006-179C-3B0C-1691271C92B4}"/>
-              </a:ext>
-            </a:extLst>
-          </p:cNvPr>
-          <p:cNvPicPr>
-            <a:picLocks noGrp="1" noChangeAspect="1"/>
-          </p:cNvPicPr>
-          <p:nvPr>
-            <p:ph idx="1"/>
-          </p:nvPr>
-        </p:nvPicPr>
-        <p:blipFill>
-          <a:blip r:embed="rId2"/>
-          <a:stretch>
-            <a:fillRect/>
-          </a:stretch>
-        </p:blipFill>
-        <p:spPr>
-          <a:xfrm>
-            <a:off x="838199" y="1902598"/>
-            <a:ext cx="8174269" cy="3637063"/>
-          </a:xfrm>
-        </p:spPr>
-      </p:pic>
-    </p:spTree>
-    <p:extLst>
-      <p:ext uri="{BB962C8B-B14F-4D97-AF65-F5344CB8AC3E}">
-        <p14:creationId xmlns:p14="http://schemas.microsoft.com/office/powerpoint/2010/main" val="2410797446"/>
       </p:ext>
     </p:extLst>
   </p:cSld>

</xml_diff>